<commit_message>
Documentation updated. All tempalate for validity rules introduced. Forced typoe for exprtession introduced ointo the grammar
</commit_message>
<xml_diff>
--- a/Docs/Object world.pptx
+++ b/Docs/Object world.pptx
@@ -9,7 +9,9 @@
     <p:sldId id="258" r:id="rId3"/>
     <p:sldId id="264" r:id="rId4"/>
     <p:sldId id="263" r:id="rId5"/>
-    <p:sldId id="265" r:id="rId6"/>
+    <p:sldId id="266" r:id="rId6"/>
+    <p:sldId id="265" r:id="rId7"/>
+    <p:sldId id="267" r:id="rId8"/>
   </p:sldIdLst>
   <p:sldSz cx="12192000" cy="6858000"/>
   <p:notesSz cx="6858000" cy="9144000"/>
@@ -242,7 +244,7 @@
           <a:p>
             <a:fld id="{ADF241A3-070E-4CCA-A8C5-FB00C42D00F4}" type="datetimeFigureOut">
               <a:rPr lang="ru-RU" smtClean="0"/>
-              <a:t>05.12.2022</a:t>
+              <a:t>24.12.2022</a:t>
             </a:fld>
             <a:endParaRPr lang="ru-RU"/>
           </a:p>
@@ -412,7 +414,7 @@
           <a:p>
             <a:fld id="{ADF241A3-070E-4CCA-A8C5-FB00C42D00F4}" type="datetimeFigureOut">
               <a:rPr lang="ru-RU" smtClean="0"/>
-              <a:t>05.12.2022</a:t>
+              <a:t>24.12.2022</a:t>
             </a:fld>
             <a:endParaRPr lang="ru-RU"/>
           </a:p>
@@ -592,7 +594,7 @@
           <a:p>
             <a:fld id="{ADF241A3-070E-4CCA-A8C5-FB00C42D00F4}" type="datetimeFigureOut">
               <a:rPr lang="ru-RU" smtClean="0"/>
-              <a:t>05.12.2022</a:t>
+              <a:t>24.12.2022</a:t>
             </a:fld>
             <a:endParaRPr lang="ru-RU"/>
           </a:p>
@@ -762,7 +764,7 @@
           <a:p>
             <a:fld id="{ADF241A3-070E-4CCA-A8C5-FB00C42D00F4}" type="datetimeFigureOut">
               <a:rPr lang="ru-RU" smtClean="0"/>
-              <a:t>05.12.2022</a:t>
+              <a:t>24.12.2022</a:t>
             </a:fld>
             <a:endParaRPr lang="ru-RU"/>
           </a:p>
@@ -1008,7 +1010,7 @@
           <a:p>
             <a:fld id="{ADF241A3-070E-4CCA-A8C5-FB00C42D00F4}" type="datetimeFigureOut">
               <a:rPr lang="ru-RU" smtClean="0"/>
-              <a:t>05.12.2022</a:t>
+              <a:t>24.12.2022</a:t>
             </a:fld>
             <a:endParaRPr lang="ru-RU"/>
           </a:p>
@@ -1240,7 +1242,7 @@
           <a:p>
             <a:fld id="{ADF241A3-070E-4CCA-A8C5-FB00C42D00F4}" type="datetimeFigureOut">
               <a:rPr lang="ru-RU" smtClean="0"/>
-              <a:t>05.12.2022</a:t>
+              <a:t>24.12.2022</a:t>
             </a:fld>
             <a:endParaRPr lang="ru-RU"/>
           </a:p>
@@ -1607,7 +1609,7 @@
           <a:p>
             <a:fld id="{ADF241A3-070E-4CCA-A8C5-FB00C42D00F4}" type="datetimeFigureOut">
               <a:rPr lang="ru-RU" smtClean="0"/>
-              <a:t>05.12.2022</a:t>
+              <a:t>24.12.2022</a:t>
             </a:fld>
             <a:endParaRPr lang="ru-RU"/>
           </a:p>
@@ -1725,7 +1727,7 @@
           <a:p>
             <a:fld id="{ADF241A3-070E-4CCA-A8C5-FB00C42D00F4}" type="datetimeFigureOut">
               <a:rPr lang="ru-RU" smtClean="0"/>
-              <a:t>05.12.2022</a:t>
+              <a:t>24.12.2022</a:t>
             </a:fld>
             <a:endParaRPr lang="ru-RU"/>
           </a:p>
@@ -1820,7 +1822,7 @@
           <a:p>
             <a:fld id="{ADF241A3-070E-4CCA-A8C5-FB00C42D00F4}" type="datetimeFigureOut">
               <a:rPr lang="ru-RU" smtClean="0"/>
-              <a:t>05.12.2022</a:t>
+              <a:t>24.12.2022</a:t>
             </a:fld>
             <a:endParaRPr lang="ru-RU"/>
           </a:p>
@@ -2097,7 +2099,7 @@
           <a:p>
             <a:fld id="{ADF241A3-070E-4CCA-A8C5-FB00C42D00F4}" type="datetimeFigureOut">
               <a:rPr lang="ru-RU" smtClean="0"/>
-              <a:t>05.12.2022</a:t>
+              <a:t>24.12.2022</a:t>
             </a:fld>
             <a:endParaRPr lang="ru-RU"/>
           </a:p>
@@ -2350,7 +2352,7 @@
           <a:p>
             <a:fld id="{ADF241A3-070E-4CCA-A8C5-FB00C42D00F4}" type="datetimeFigureOut">
               <a:rPr lang="ru-RU" smtClean="0"/>
-              <a:t>05.12.2022</a:t>
+              <a:t>24.12.2022</a:t>
             </a:fld>
             <a:endParaRPr lang="ru-RU"/>
           </a:p>
@@ -2563,7 +2565,7 @@
           <a:p>
             <a:fld id="{ADF241A3-070E-4CCA-A8C5-FB00C42D00F4}" type="datetimeFigureOut">
               <a:rPr lang="ru-RU" smtClean="0"/>
-              <a:t>05.12.2022</a:t>
+              <a:t>24.12.2022</a:t>
             </a:fld>
             <a:endParaRPr lang="ru-RU"/>
           </a:p>
@@ -3364,7 +3366,7 @@
         <p:spPr bwMode="auto">
           <a:xfrm>
             <a:off x="73658" y="599509"/>
-            <a:ext cx="6617896" cy="5607689"/>
+            <a:ext cx="6617896" cy="6038576"/>
           </a:xfrm>
           <a:prstGeom prst="rect">
             <a:avLst/>
@@ -3734,9 +3736,16 @@
                 <a:latin typeface="Times New Roman" panose="02020603050405020304" pitchFamily="18" charset="0"/>
                 <a:cs typeface="Times New Roman" panose="02020603050405020304" pitchFamily="18" charset="0"/>
               </a:rPr>
-              <a:t>activation</a:t>
-            </a:r>
-            <a:endParaRPr lang="en-US" altLang="ru-RU" dirty="0">
+              <a:t>activations – </a:t>
+            </a:r>
+            <a:r>
+              <a:rPr lang="en-US" altLang="ru-RU" b="1" dirty="0" smtClean="0">
+                <a:latin typeface="Times New Roman" panose="02020603050405020304" pitchFamily="18" charset="0"/>
+                <a:cs typeface="Times New Roman" panose="02020603050405020304" pitchFamily="18" charset="0"/>
+              </a:rPr>
+              <a:t>TBD!!!</a:t>
+            </a:r>
+            <a:endParaRPr lang="en-US" altLang="ru-RU" b="1" dirty="0">
               <a:latin typeface="Times New Roman" panose="02020603050405020304" pitchFamily="18" charset="0"/>
               <a:cs typeface="Times New Roman" panose="02020603050405020304" pitchFamily="18" charset="0"/>
             </a:endParaRPr>
@@ -4159,22 +4168,13 @@
               <a:t> </a:t>
             </a:r>
             <a:r>
-              <a:rPr lang="de-DE" sz="1800" b="1" dirty="0" err="1">
-                <a:solidFill>
-                  <a:srgbClr val="0000FF"/>
-                </a:solidFill>
-                <a:latin typeface="Lucida Console" panose="020B0609040504020204" pitchFamily="49" charset="0"/>
-              </a:rPr>
-              <a:t>o</a:t>
-            </a:r>
-            <a:r>
               <a:rPr lang="de-DE" sz="1800" b="1" dirty="0" err="1" smtClean="0">
                 <a:solidFill>
                   <a:srgbClr val="0000FF"/>
                 </a:solidFill>
                 <a:latin typeface="Lucida Console" panose="020B0609040504020204" pitchFamily="49" charset="0"/>
               </a:rPr>
-              <a:t>bject</a:t>
+              <a:t>object</a:t>
             </a:r>
             <a:r>
               <a:rPr lang="de-DE" sz="1800" b="1" dirty="0" smtClean="0">
@@ -4186,42 +4186,60 @@
               <a:t> </a:t>
             </a:r>
             <a:r>
-              <a:rPr lang="de-DE" sz="1800" dirty="0">
-                <a:solidFill>
-                  <a:srgbClr val="0000FF"/>
-                </a:solidFill>
-                <a:latin typeface="Lucida Console" panose="020B0609040504020204" pitchFamily="49" charset="0"/>
-              </a:rPr>
-              <a:t>{ </a:t>
-            </a:r>
-            <a:r>
               <a:rPr lang="de-DE" sz="1800" dirty="0" smtClean="0">
                 <a:solidFill>
                   <a:srgbClr val="0000FF"/>
                 </a:solidFill>
                 <a:latin typeface="Lucida Console" panose="020B0609040504020204" pitchFamily="49" charset="0"/>
               </a:rPr>
+              <a:t>{  </a:t>
+            </a:r>
+          </a:p>
+          <a:p>
+            <a:r>
+              <a:rPr lang="de-DE" sz="1800" b="1" dirty="0" smtClean="0">
+                <a:solidFill>
+                  <a:srgbClr val="0000FF"/>
+                </a:solidFill>
+                <a:latin typeface="Lucida Console" panose="020B0609040504020204" pitchFamily="49" charset="0"/>
+              </a:rPr>
+              <a:t>  </a:t>
+            </a:r>
+            <a:r>
+              <a:rPr lang="de-DE" sz="1800" b="1" dirty="0" err="1" smtClean="0">
+                <a:solidFill>
+                  <a:srgbClr val="0000FF"/>
+                </a:solidFill>
+                <a:latin typeface="Lucida Console" panose="020B0609040504020204" pitchFamily="49" charset="0"/>
+              </a:rPr>
+              <a:t>const</a:t>
+            </a:r>
+            <a:r>
+              <a:rPr lang="de-DE" sz="1800" b="1" dirty="0" smtClean="0">
+                <a:solidFill>
+                  <a:srgbClr val="0000FF"/>
+                </a:solidFill>
+                <a:latin typeface="Lucida Console" panose="020B0609040504020204" pitchFamily="49" charset="0"/>
+              </a:rPr>
               <a:t> </a:t>
             </a:r>
-          </a:p>
-          <a:p>
-            <a:r>
-              <a:rPr lang="de-DE" sz="1800" b="1" dirty="0">
-                <a:solidFill>
-                  <a:srgbClr val="0000FF"/>
-                </a:solidFill>
-                <a:latin typeface="Lucida Console" panose="020B0609040504020204" pitchFamily="49" charset="0"/>
-              </a:rPr>
-              <a:t> </a:t>
-            </a:r>
-            <a:r>
-              <a:rPr lang="de-DE" sz="1800" b="1" dirty="0" smtClean="0">
-                <a:solidFill>
-                  <a:srgbClr val="0000FF"/>
-                </a:solidFill>
-                <a:latin typeface="Lucida Console" panose="020B0609040504020204" pitchFamily="49" charset="0"/>
-              </a:rPr>
-              <a:t> </a:t>
+            <a:r>
+              <a:rPr lang="de-DE" sz="1800" dirty="0" err="1" smtClean="0">
+                <a:solidFill>
+                  <a:srgbClr val="0000FF"/>
+                </a:solidFill>
+                <a:latin typeface="Lucida Console" panose="020B0609040504020204" pitchFamily="49" charset="0"/>
+              </a:rPr>
+              <a:t>main</a:t>
+            </a:r>
+            <a:r>
+              <a:rPr lang="de-DE" sz="1800" dirty="0" smtClean="0">
+                <a:solidFill>
+                  <a:srgbClr val="0000FF"/>
+                </a:solidFill>
+                <a:latin typeface="Lucida Console" panose="020B0609040504020204" pitchFamily="49" charset="0"/>
+              </a:rPr>
+              <a:t>: </a:t>
             </a:r>
             <a:r>
               <a:rPr lang="de-DE" sz="1800" b="1" dirty="0" err="1" smtClean="0">
@@ -4230,16 +4248,16 @@
                 </a:solidFill>
                 <a:latin typeface="Lucida Console" panose="020B0609040504020204" pitchFamily="49" charset="0"/>
               </a:rPr>
-              <a:t>const</a:t>
-            </a:r>
-            <a:r>
-              <a:rPr lang="de-DE" sz="1800" b="1" dirty="0" smtClean="0">
-                <a:solidFill>
-                  <a:srgbClr val="0000FF"/>
-                </a:solidFill>
-                <a:latin typeface="Lucida Console" panose="020B0609040504020204" pitchFamily="49" charset="0"/>
-              </a:rPr>
-              <a:t> </a:t>
+              <a:t>rtn</a:t>
+            </a:r>
+            <a:r>
+              <a:rPr lang="de-DE" sz="1800" dirty="0" smtClean="0">
+                <a:solidFill>
+                  <a:srgbClr val="0000FF"/>
+                </a:solidFill>
+                <a:latin typeface="Lucida Console" panose="020B0609040504020204" pitchFamily="49" charset="0"/>
+              </a:rPr>
+              <a:t> (</a:t>
             </a:r>
             <a:r>
               <a:rPr lang="de-DE" sz="1800" dirty="0" err="1" smtClean="0">
@@ -4248,7 +4266,7 @@
                 </a:solidFill>
                 <a:latin typeface="Lucida Console" panose="020B0609040504020204" pitchFamily="49" charset="0"/>
               </a:rPr>
-              <a:t>main</a:t>
+              <a:t>args</a:t>
             </a:r>
             <a:r>
               <a:rPr lang="de-DE" sz="1800" dirty="0" smtClean="0">
@@ -4257,17 +4275,10 @@
                 </a:solidFill>
                 <a:latin typeface="Lucida Console" panose="020B0609040504020204" pitchFamily="49" charset="0"/>
               </a:rPr>
-              <a:t>: </a:t>
-            </a:r>
-            <a:r>
-              <a:rPr lang="de-DE" sz="1800" b="1" dirty="0" err="1" smtClean="0">
-                <a:solidFill>
-                  <a:srgbClr val="0000FF"/>
-                </a:solidFill>
-                <a:latin typeface="Lucida Console" panose="020B0609040504020204" pitchFamily="49" charset="0"/>
-              </a:rPr>
-              <a:t>rtn</a:t>
-            </a:r>
+              <a:t>:   Array&lt;String&gt;)</a:t>
+            </a:r>
+          </a:p>
+          <a:p>
             <a:r>
               <a:rPr lang="de-DE" sz="1800" dirty="0" smtClean="0">
                 <a:solidFill>
@@ -4275,45 +4286,7 @@
                 </a:solidFill>
                 <a:latin typeface="Lucida Console" panose="020B0609040504020204" pitchFamily="49" charset="0"/>
               </a:rPr>
-              <a:t> (</a:t>
-            </a:r>
-            <a:r>
-              <a:rPr lang="de-DE" sz="1800" dirty="0" err="1" smtClean="0">
-                <a:solidFill>
-                  <a:srgbClr val="0000FF"/>
-                </a:solidFill>
-                <a:latin typeface="Lucida Console" panose="020B0609040504020204" pitchFamily="49" charset="0"/>
-              </a:rPr>
-              <a:t>args</a:t>
-            </a:r>
-            <a:r>
-              <a:rPr lang="de-DE" sz="1800" dirty="0" smtClean="0">
-                <a:solidFill>
-                  <a:srgbClr val="0000FF"/>
-                </a:solidFill>
-                <a:latin typeface="Lucida Console" panose="020B0609040504020204" pitchFamily="49" charset="0"/>
-              </a:rPr>
-              <a:t>:   Array&lt;String&gt;)</a:t>
-            </a:r>
-          </a:p>
-          <a:p>
-            <a:r>
-              <a:rPr lang="de-DE" sz="1800" dirty="0">
-                <a:solidFill>
-                  <a:srgbClr val="0000FF"/>
-                </a:solidFill>
-                <a:latin typeface="Lucida Console" panose="020B0609040504020204" pitchFamily="49" charset="0"/>
-              </a:rPr>
-              <a:t> </a:t>
-            </a:r>
-            <a:r>
-              <a:rPr lang="de-DE" sz="1800" dirty="0" smtClean="0">
-                <a:solidFill>
-                  <a:srgbClr val="0000FF"/>
-                </a:solidFill>
-                <a:latin typeface="Lucida Console" panose="020B0609040504020204" pitchFamily="49" charset="0"/>
-              </a:rPr>
-              <a:t> {</a:t>
+              <a:t>  {</a:t>
             </a:r>
             <a:endParaRPr lang="de-DE" sz="1800" b="1" dirty="0" smtClean="0">
               <a:solidFill>
@@ -4351,27 +4324,36 @@
               <a:t> </a:t>
             </a:r>
             <a:r>
-              <a:rPr lang="de-DE" sz="1800" dirty="0">
-                <a:solidFill>
-                  <a:srgbClr val="0000FF"/>
-                </a:solidFill>
-                <a:latin typeface="Lucida Console" panose="020B0609040504020204" pitchFamily="49" charset="0"/>
-              </a:rPr>
-              <a:t>I</a:t>
-            </a:r>
-            <a:r>
               <a:rPr lang="de-DE" sz="1800" dirty="0" smtClean="0">
                 <a:solidFill>
                   <a:srgbClr val="0000FF"/>
                 </a:solidFill>
                 <a:latin typeface="Lucida Console" panose="020B0609040504020204" pitchFamily="49" charset="0"/>
               </a:rPr>
-              <a:t>nteger.5</a:t>
-            </a:r>
-          </a:p>
-          <a:p>
-            <a:r>
-              <a:rPr lang="de-DE" sz="1800" b="1" dirty="0">
+              <a:t>Integer.5</a:t>
+            </a:r>
+          </a:p>
+          <a:p>
+            <a:r>
+              <a:rPr lang="de-DE" sz="1800" b="1" dirty="0" smtClean="0">
+                <a:solidFill>
+                  <a:srgbClr val="0000FF"/>
+                </a:solidFill>
+                <a:latin typeface="Lucida Console" panose="020B0609040504020204" pitchFamily="49" charset="0"/>
+              </a:rPr>
+              <a:t>   </a:t>
+            </a:r>
+            <a:r>
+              <a:rPr lang="de-DE" sz="1800" b="1" dirty="0" err="1" smtClean="0">
+                <a:solidFill>
+                  <a:srgbClr val="0000FF"/>
+                </a:solidFill>
+                <a:latin typeface="Lucida Console" panose="020B0609040504020204" pitchFamily="49" charset="0"/>
+              </a:rPr>
+              <a:t>object</a:t>
+            </a:r>
+            <a:r>
+              <a:rPr lang="de-DE" sz="1800" b="1" dirty="0" smtClean="0">
                 <a:solidFill>
                   <a:srgbClr val="0000FF"/>
                 </a:solidFill>
@@ -4380,125 +4362,89 @@
               <a:t> </a:t>
             </a:r>
             <a:r>
+              <a:rPr lang="de-DE" sz="1800" dirty="0" smtClean="0">
+                <a:solidFill>
+                  <a:srgbClr val="0000FF"/>
+                </a:solidFill>
+                <a:latin typeface="Lucida Console" panose="020B0609040504020204" pitchFamily="49" charset="0"/>
+              </a:rPr>
+              <a:t>Cardinal.5</a:t>
+            </a:r>
+          </a:p>
+          <a:p>
+            <a:r>
+              <a:rPr lang="de-DE" sz="1800" dirty="0" smtClean="0">
+                <a:solidFill>
+                  <a:srgbClr val="0000FF"/>
+                </a:solidFill>
+                <a:latin typeface="Lucida Console" panose="020B0609040504020204" pitchFamily="49" charset="0"/>
+              </a:rPr>
+              <a:t>   </a:t>
+            </a:r>
+            <a:r>
+              <a:rPr lang="de-DE" sz="1800" dirty="0" err="1" smtClean="0">
+                <a:solidFill>
+                  <a:srgbClr val="0000FF"/>
+                </a:solidFill>
+                <a:latin typeface="Lucida Console" panose="020B0609040504020204" pitchFamily="49" charset="0"/>
+              </a:rPr>
+              <a:t>Console.put</a:t>
+            </a:r>
+            <a:r>
+              <a:rPr lang="de-DE" sz="1800" dirty="0" smtClean="0">
+                <a:solidFill>
+                  <a:srgbClr val="0000FF"/>
+                </a:solidFill>
+                <a:latin typeface="Lucida Console" panose="020B0609040504020204" pitchFamily="49" charset="0"/>
+              </a:rPr>
+              <a:t> (</a:t>
+            </a:r>
+            <a:r>
+              <a:rPr lang="de-DE" sz="1800" b="1" dirty="0" err="1" smtClean="0">
+                <a:solidFill>
+                  <a:srgbClr val="0000FF"/>
+                </a:solidFill>
+                <a:latin typeface="Lucida Console" panose="020B0609040504020204" pitchFamily="49" charset="0"/>
+              </a:rPr>
+              <a:t>object</a:t>
+            </a:r>
+            <a:r>
               <a:rPr lang="de-DE" sz="1800" b="1" dirty="0" smtClean="0">
                 <a:solidFill>
                   <a:srgbClr val="0000FF"/>
                 </a:solidFill>
                 <a:latin typeface="Lucida Console" panose="020B0609040504020204" pitchFamily="49" charset="0"/>
               </a:rPr>
+              <a:t> </a:t>
+            </a:r>
+            <a:r>
+              <a:rPr lang="de-DE" sz="1800" dirty="0" smtClean="0">
+                <a:solidFill>
+                  <a:srgbClr val="0000FF"/>
+                </a:solidFill>
+                <a:latin typeface="Lucida Console" panose="020B0609040504020204" pitchFamily="49" charset="0"/>
+              </a:rPr>
+              <a:t>Integer.5.+(Cardinal.5))</a:t>
+            </a:r>
+          </a:p>
+          <a:p>
+            <a:r>
+              <a:rPr lang="de-DE" sz="1800" dirty="0" smtClean="0">
+                <a:solidFill>
+                  <a:srgbClr val="0000FF"/>
+                </a:solidFill>
+                <a:latin typeface="Lucida Console" panose="020B0609040504020204" pitchFamily="49" charset="0"/>
+              </a:rPr>
               <a:t>  </a:t>
             </a:r>
             <a:r>
-              <a:rPr lang="de-DE" sz="1800" b="1" dirty="0" err="1" smtClean="0">
-                <a:solidFill>
-                  <a:srgbClr val="0000FF"/>
-                </a:solidFill>
-                <a:latin typeface="Lucida Console" panose="020B0609040504020204" pitchFamily="49" charset="0"/>
-              </a:rPr>
-              <a:t>object</a:t>
-            </a:r>
-            <a:r>
-              <a:rPr lang="de-DE" sz="1800" b="1" dirty="0" smtClean="0">
-                <a:solidFill>
-                  <a:srgbClr val="0000FF"/>
-                </a:solidFill>
-                <a:latin typeface="Lucida Console" panose="020B0609040504020204" pitchFamily="49" charset="0"/>
-              </a:rPr>
-              <a:t> </a:t>
-            </a:r>
-            <a:r>
               <a:rPr lang="de-DE" sz="1800" dirty="0" smtClean="0">
                 <a:solidFill>
                   <a:srgbClr val="0000FF"/>
                 </a:solidFill>
                 <a:latin typeface="Lucida Console" panose="020B0609040504020204" pitchFamily="49" charset="0"/>
               </a:rPr>
-              <a:t>Cardinal.5</a:t>
-            </a:r>
-          </a:p>
-          <a:p>
-            <a:r>
-              <a:rPr lang="de-DE" sz="1800" dirty="0" smtClean="0">
-                <a:solidFill>
-                  <a:srgbClr val="0000FF"/>
-                </a:solidFill>
-                <a:latin typeface="Lucida Console" panose="020B0609040504020204" pitchFamily="49" charset="0"/>
-              </a:rPr>
-              <a:t>   </a:t>
-            </a:r>
-            <a:r>
-              <a:rPr lang="de-DE" sz="1800" dirty="0" err="1" smtClean="0">
-                <a:solidFill>
-                  <a:srgbClr val="0000FF"/>
-                </a:solidFill>
-                <a:latin typeface="Lucida Console" panose="020B0609040504020204" pitchFamily="49" charset="0"/>
-              </a:rPr>
-              <a:t>Console.put</a:t>
-            </a:r>
-            <a:r>
-              <a:rPr lang="de-DE" sz="1800" dirty="0" smtClean="0">
-                <a:solidFill>
-                  <a:srgbClr val="0000FF"/>
-                </a:solidFill>
-                <a:latin typeface="Lucida Console" panose="020B0609040504020204" pitchFamily="49" charset="0"/>
-              </a:rPr>
-              <a:t> (</a:t>
-            </a:r>
-            <a:r>
-              <a:rPr lang="de-DE" sz="1800" b="1" dirty="0" err="1">
-                <a:solidFill>
-                  <a:srgbClr val="0000FF"/>
-                </a:solidFill>
-                <a:latin typeface="Lucida Console" panose="020B0609040504020204" pitchFamily="49" charset="0"/>
-              </a:rPr>
-              <a:t>object</a:t>
-            </a:r>
-            <a:r>
-              <a:rPr lang="de-DE" sz="1800" b="1" dirty="0">
-                <a:solidFill>
-                  <a:srgbClr val="0000FF"/>
-                </a:solidFill>
-                <a:latin typeface="Lucida Console" panose="020B0609040504020204" pitchFamily="49" charset="0"/>
-              </a:rPr>
-              <a:t> </a:t>
-            </a:r>
-            <a:r>
-              <a:rPr lang="de-DE" sz="1800" dirty="0" smtClean="0">
-                <a:solidFill>
-                  <a:srgbClr val="0000FF"/>
-                </a:solidFill>
-                <a:latin typeface="Lucida Console" panose="020B0609040504020204" pitchFamily="49" charset="0"/>
-              </a:rPr>
-              <a:t>Integer.5</a:t>
-            </a:r>
-            <a:r>
-              <a:rPr lang="de-DE" sz="1800" dirty="0">
-                <a:solidFill>
-                  <a:srgbClr val="0000FF"/>
-                </a:solidFill>
-                <a:latin typeface="Lucida Console" panose="020B0609040504020204" pitchFamily="49" charset="0"/>
-              </a:rPr>
-              <a:t>.+(Cardinal.5)</a:t>
-            </a:r>
-            <a:r>
-              <a:rPr lang="de-DE" sz="1800" dirty="0" smtClean="0">
-                <a:solidFill>
-                  <a:srgbClr val="0000FF"/>
-                </a:solidFill>
-                <a:latin typeface="Lucida Console" panose="020B0609040504020204" pitchFamily="49" charset="0"/>
-              </a:rPr>
-              <a:t>)</a:t>
-            </a:r>
-          </a:p>
-          <a:p>
-            <a:r>
-              <a:rPr lang="de-DE" sz="1800" dirty="0" smtClean="0">
-                <a:solidFill>
-                  <a:srgbClr val="0000FF"/>
-                </a:solidFill>
-                <a:latin typeface="Lucida Console" panose="020B0609040504020204" pitchFamily="49" charset="0"/>
-              </a:rPr>
-              <a:t>  }  </a:t>
+              <a:t>}  </a:t>
             </a:r>
           </a:p>
           <a:p>
@@ -4533,7 +4479,7 @@
         <p:spPr bwMode="auto">
           <a:xfrm>
             <a:off x="86070" y="682258"/>
-            <a:ext cx="6277491" cy="4130361"/>
+            <a:ext cx="6277491" cy="3761030"/>
           </a:xfrm>
           <a:prstGeom prst="rect">
             <a:avLst/>
@@ -4712,8 +4658,12 @@
                 <a:latin typeface="Times New Roman" panose="02020603050405020304" pitchFamily="18" charset="0"/>
                 <a:cs typeface="Times New Roman" panose="02020603050405020304" pitchFamily="18" charset="0"/>
               </a:rPr>
-              <a:t>Address</a:t>
-            </a:r>
+              <a:t>Type</a:t>
+            </a:r>
+            <a:endParaRPr lang="en-US" altLang="ru-RU" sz="2400" dirty="0" smtClean="0">
+              <a:latin typeface="Times New Roman" panose="02020603050405020304" pitchFamily="18" charset="0"/>
+              <a:cs typeface="Times New Roman" panose="02020603050405020304" pitchFamily="18" charset="0"/>
+            </a:endParaRPr>
           </a:p>
           <a:p>
             <a:pPr marL="1200150" lvl="1" indent="-457200" eaLnBrk="1" hangingPunct="1"/>
@@ -4722,8 +4672,12 @@
                 <a:latin typeface="Times New Roman" panose="02020603050405020304" pitchFamily="18" charset="0"/>
                 <a:cs typeface="Times New Roman" panose="02020603050405020304" pitchFamily="18" charset="0"/>
               </a:rPr>
-              <a:t>Size</a:t>
-            </a:r>
+              <a:t>Address in memory (this)</a:t>
+            </a:r>
+            <a:endParaRPr lang="en-US" altLang="ru-RU" sz="2400" dirty="0" smtClean="0">
+              <a:latin typeface="Times New Roman" panose="02020603050405020304" pitchFamily="18" charset="0"/>
+              <a:cs typeface="Times New Roman" panose="02020603050405020304" pitchFamily="18" charset="0"/>
+            </a:endParaRPr>
           </a:p>
           <a:p>
             <a:pPr marL="457200" indent="-457200" eaLnBrk="1" hangingPunct="1"/>
@@ -4732,7 +4686,14 @@
                 <a:latin typeface="Times New Roman" panose="02020603050405020304" pitchFamily="18" charset="0"/>
                 <a:cs typeface="Times New Roman" panose="02020603050405020304" pitchFamily="18" charset="0"/>
               </a:rPr>
-              <a:t>What is the structure of an object?</a:t>
+              <a:t>What </a:t>
+            </a:r>
+            <a:r>
+              <a:rPr lang="en-US" altLang="ru-RU" sz="2800" dirty="0" smtClean="0">
+                <a:latin typeface="Times New Roman" panose="02020603050405020304" pitchFamily="18" charset="0"/>
+                <a:cs typeface="Times New Roman" panose="02020603050405020304" pitchFamily="18" charset="0"/>
+              </a:rPr>
+              <a:t>is the structure of an object?</a:t>
             </a:r>
           </a:p>
           <a:p>
@@ -4752,7 +4713,14 @@
                 <a:latin typeface="Times New Roman" panose="02020603050405020304" pitchFamily="18" charset="0"/>
                 <a:cs typeface="Times New Roman" panose="02020603050405020304" pitchFamily="18" charset="0"/>
               </a:rPr>
-              <a:t>Does object have a type?</a:t>
+              <a:t>What is object type</a:t>
+            </a:r>
+            <a:r>
+              <a:rPr lang="en-US" altLang="ru-RU" sz="2800" dirty="0" smtClean="0">
+                <a:latin typeface="Times New Roman" panose="02020603050405020304" pitchFamily="18" charset="0"/>
+                <a:cs typeface="Times New Roman" panose="02020603050405020304" pitchFamily="18" charset="0"/>
+              </a:rPr>
+              <a:t>?</a:t>
             </a:r>
           </a:p>
           <a:p>
@@ -4762,8 +4730,26 @@
                 <a:latin typeface="Times New Roman" panose="02020603050405020304" pitchFamily="18" charset="0"/>
                 <a:cs typeface="Times New Roman" panose="02020603050405020304" pitchFamily="18" charset="0"/>
               </a:rPr>
-              <a:t>Yes. Set of all object attributes defines a type</a:t>
-            </a:r>
+              <a:t>Set </a:t>
+            </a:r>
+            <a:r>
+              <a:rPr lang="en-US" altLang="ru-RU" sz="2400" dirty="0" smtClean="0">
+                <a:latin typeface="Times New Roman" panose="02020603050405020304" pitchFamily="18" charset="0"/>
+                <a:cs typeface="Times New Roman" panose="02020603050405020304" pitchFamily="18" charset="0"/>
+              </a:rPr>
+              <a:t>of all object </a:t>
+            </a:r>
+            <a:r>
+              <a:rPr lang="en-US" altLang="ru-RU" sz="2400" dirty="0" smtClean="0">
+                <a:latin typeface="Times New Roman" panose="02020603050405020304" pitchFamily="18" charset="0"/>
+                <a:cs typeface="Times New Roman" panose="02020603050405020304" pitchFamily="18" charset="0"/>
+              </a:rPr>
+              <a:t>attributes</a:t>
+            </a:r>
+            <a:endParaRPr lang="en-US" altLang="ru-RU" sz="2400" dirty="0" smtClean="0">
+              <a:latin typeface="Times New Roman" panose="02020603050405020304" pitchFamily="18" charset="0"/>
+              <a:cs typeface="Times New Roman" panose="02020603050405020304" pitchFamily="18" charset="0"/>
+            </a:endParaRPr>
           </a:p>
         </p:txBody>
       </p:sp>
@@ -4975,13 +4961,136 @@
           </a:lstStyle>
           <a:p>
             <a:r>
+              <a:rPr lang="de-DE" sz="1800" b="1" dirty="0" err="1" smtClean="0">
+                <a:solidFill>
+                  <a:srgbClr val="0000FF"/>
+                </a:solidFill>
+                <a:latin typeface="Lucida Console" panose="020B0609040504020204" pitchFamily="49" charset="0"/>
+              </a:rPr>
+              <a:t>destroy</a:t>
+            </a:r>
+            <a:r>
+              <a:rPr lang="de-DE" sz="1800" b="1" dirty="0" smtClean="0">
+                <a:solidFill>
+                  <a:srgbClr val="0000FF"/>
+                </a:solidFill>
+                <a:latin typeface="Lucida Console" panose="020B0609040504020204" pitchFamily="49" charset="0"/>
+              </a:rPr>
+              <a:t> </a:t>
+            </a:r>
+            <a:r>
               <a:rPr lang="de-DE" sz="1800" dirty="0" smtClean="0">
                 <a:solidFill>
                   <a:srgbClr val="0000FF"/>
                 </a:solidFill>
                 <a:latin typeface="Lucida Console" panose="020B0609040504020204" pitchFamily="49" charset="0"/>
               </a:rPr>
-              <a:t>/* Operating </a:t>
+              <a:t>(</a:t>
+            </a:r>
+          </a:p>
+          <a:p>
+            <a:r>
+              <a:rPr lang="de-DE" sz="1800" b="1" dirty="0" smtClean="0">
+                <a:solidFill>
+                  <a:srgbClr val="0000FF"/>
+                </a:solidFill>
+                <a:latin typeface="Lucida Console" panose="020B0609040504020204" pitchFamily="49" charset="0"/>
+              </a:rPr>
+              <a:t>  </a:t>
+            </a:r>
+            <a:r>
+              <a:rPr lang="de-DE" sz="1800" b="1" dirty="0" err="1" smtClean="0">
+                <a:solidFill>
+                  <a:srgbClr val="0000FF"/>
+                </a:solidFill>
+                <a:latin typeface="Lucida Console" panose="020B0609040504020204" pitchFamily="49" charset="0"/>
+              </a:rPr>
+              <a:t>n</a:t>
+            </a:r>
+            <a:r>
+              <a:rPr lang="de-DE" sz="1800" b="1" dirty="0" err="1" smtClean="0">
+                <a:solidFill>
+                  <a:srgbClr val="0000FF"/>
+                </a:solidFill>
+                <a:latin typeface="Lucida Console" panose="020B0609040504020204" pitchFamily="49" charset="0"/>
+              </a:rPr>
+              <a:t>ew</a:t>
+            </a:r>
+            <a:r>
+              <a:rPr lang="de-DE" sz="1800" b="1" dirty="0" smtClean="0">
+                <a:solidFill>
+                  <a:srgbClr val="0000FF"/>
+                </a:solidFill>
+                <a:latin typeface="Lucida Console" panose="020B0609040504020204" pitchFamily="49" charset="0"/>
+              </a:rPr>
+              <a:t> </a:t>
+            </a:r>
+            <a:r>
+              <a:rPr lang="de-DE" sz="1800" b="1" dirty="0" err="1" smtClean="0">
+                <a:solidFill>
+                  <a:srgbClr val="0000FF"/>
+                </a:solidFill>
+                <a:latin typeface="Lucida Console" panose="020B0609040504020204" pitchFamily="49" charset="0"/>
+              </a:rPr>
+              <a:t>object</a:t>
+            </a:r>
+            <a:r>
+              <a:rPr lang="de-DE" sz="1800" b="1" dirty="0" smtClean="0">
+                <a:solidFill>
+                  <a:srgbClr val="0000FF"/>
+                </a:solidFill>
+                <a:latin typeface="Lucida Console" panose="020B0609040504020204" pitchFamily="49" charset="0"/>
+              </a:rPr>
+              <a:t> </a:t>
+            </a:r>
+            <a:r>
+              <a:rPr lang="de-DE" sz="1800" dirty="0" smtClean="0">
+                <a:solidFill>
+                  <a:srgbClr val="0000FF"/>
+                </a:solidFill>
+                <a:latin typeface="Lucida Console" panose="020B0609040504020204" pitchFamily="49" charset="0"/>
+              </a:rPr>
+              <a:t>{</a:t>
+            </a:r>
+          </a:p>
+          <a:p>
+            <a:r>
+              <a:rPr lang="de-DE" sz="1800" dirty="0">
+                <a:solidFill>
+                  <a:srgbClr val="0000FF"/>
+                </a:solidFill>
+                <a:latin typeface="Lucida Console" panose="020B0609040504020204" pitchFamily="49" charset="0"/>
+              </a:rPr>
+              <a:t> </a:t>
+            </a:r>
+            <a:r>
+              <a:rPr lang="de-DE" sz="1800" dirty="0" smtClean="0">
+                <a:solidFill>
+                  <a:srgbClr val="0000FF"/>
+                </a:solidFill>
+                <a:latin typeface="Lucida Console" panose="020B0609040504020204" pitchFamily="49" charset="0"/>
+              </a:rPr>
+              <a:t>    attr1: Integer.5</a:t>
+            </a:r>
+          </a:p>
+          <a:p>
+            <a:r>
+              <a:rPr lang="de-DE" sz="1800" dirty="0">
+                <a:solidFill>
+                  <a:srgbClr val="0000FF"/>
+                </a:solidFill>
+                <a:latin typeface="Lucida Console" panose="020B0609040504020204" pitchFamily="49" charset="0"/>
+              </a:rPr>
+              <a:t> </a:t>
+            </a:r>
+            <a:r>
+              <a:rPr lang="de-DE" sz="1800" dirty="0" smtClean="0">
+                <a:solidFill>
+                  <a:srgbClr val="0000FF"/>
+                </a:solidFill>
+                <a:latin typeface="Lucida Console" panose="020B0609040504020204" pitchFamily="49" charset="0"/>
+              </a:rPr>
+              <a:t>    attr2: </a:t>
             </a:r>
             <a:r>
               <a:rPr lang="de-DE" sz="1800" dirty="0" err="1" smtClean="0">
@@ -4990,169 +5099,7 @@
                 </a:solidFill>
                 <a:latin typeface="Lucida Console" panose="020B0609040504020204" pitchFamily="49" charset="0"/>
               </a:rPr>
-              <a:t>system</a:t>
-            </a:r>
-            <a:r>
-              <a:rPr lang="de-DE" sz="1800" dirty="0" smtClean="0">
-                <a:solidFill>
-                  <a:srgbClr val="0000FF"/>
-                </a:solidFill>
-                <a:latin typeface="Lucida Console" panose="020B0609040504020204" pitchFamily="49" charset="0"/>
-              </a:rPr>
-              <a:t> </a:t>
-            </a:r>
-            <a:r>
-              <a:rPr lang="de-DE" sz="1800" dirty="0" err="1" smtClean="0">
-                <a:solidFill>
-                  <a:srgbClr val="0000FF"/>
-                </a:solidFill>
-                <a:latin typeface="Lucida Console" panose="020B0609040504020204" pitchFamily="49" charset="0"/>
-              </a:rPr>
-              <a:t>creates</a:t>
-            </a:r>
-            <a:r>
-              <a:rPr lang="de-DE" sz="1800" dirty="0" smtClean="0">
-                <a:solidFill>
-                  <a:srgbClr val="0000FF"/>
-                </a:solidFill>
-                <a:latin typeface="Lucida Console" panose="020B0609040504020204" pitchFamily="49" charset="0"/>
-              </a:rPr>
-              <a:t> </a:t>
-            </a:r>
-            <a:r>
-              <a:rPr lang="de-DE" sz="1800" dirty="0" err="1" smtClean="0">
-                <a:solidFill>
-                  <a:srgbClr val="0000FF"/>
-                </a:solidFill>
-                <a:latin typeface="Lucida Console" panose="020B0609040504020204" pitchFamily="49" charset="0"/>
-              </a:rPr>
-              <a:t>the</a:t>
-            </a:r>
-            <a:r>
-              <a:rPr lang="de-DE" sz="1800" dirty="0" smtClean="0">
-                <a:solidFill>
-                  <a:srgbClr val="0000FF"/>
-                </a:solidFill>
-                <a:latin typeface="Lucida Console" panose="020B0609040504020204" pitchFamily="49" charset="0"/>
-              </a:rPr>
-              <a:t> 1st </a:t>
-            </a:r>
-            <a:r>
-              <a:rPr lang="de-DE" sz="1800" dirty="0" err="1" smtClean="0">
-                <a:solidFill>
-                  <a:srgbClr val="0000FF"/>
-                </a:solidFill>
-                <a:latin typeface="Lucida Console" panose="020B0609040504020204" pitchFamily="49" charset="0"/>
-              </a:rPr>
-              <a:t>object</a:t>
-            </a:r>
-            <a:r>
-              <a:rPr lang="de-DE" sz="1800" dirty="0" smtClean="0">
-                <a:solidFill>
-                  <a:srgbClr val="0000FF"/>
-                </a:solidFill>
-                <a:latin typeface="Lucida Console" panose="020B0609040504020204" pitchFamily="49" charset="0"/>
-              </a:rPr>
-              <a:t> </a:t>
-            </a:r>
-            <a:r>
-              <a:rPr lang="de-DE" sz="1800" dirty="0" err="1" smtClean="0">
-                <a:solidFill>
-                  <a:srgbClr val="0000FF"/>
-                </a:solidFill>
-                <a:latin typeface="Lucida Console" panose="020B0609040504020204" pitchFamily="49" charset="0"/>
-              </a:rPr>
-              <a:t>and</a:t>
-            </a:r>
-            <a:r>
-              <a:rPr lang="de-DE" sz="1800" dirty="0" smtClean="0">
-                <a:solidFill>
-                  <a:srgbClr val="0000FF"/>
-                </a:solidFill>
-                <a:latin typeface="Lucida Console" panose="020B0609040504020204" pitchFamily="49" charset="0"/>
-              </a:rPr>
-              <a:t> </a:t>
-            </a:r>
-            <a:r>
-              <a:rPr lang="de-DE" sz="1800" dirty="0" err="1" smtClean="0">
-                <a:solidFill>
-                  <a:srgbClr val="0000FF"/>
-                </a:solidFill>
-                <a:latin typeface="Lucida Console" panose="020B0609040504020204" pitchFamily="49" charset="0"/>
-              </a:rPr>
-              <a:t>activates</a:t>
-            </a:r>
-            <a:r>
-              <a:rPr lang="de-DE" sz="1800" dirty="0" smtClean="0">
-                <a:solidFill>
-                  <a:srgbClr val="0000FF"/>
-                </a:solidFill>
-                <a:latin typeface="Lucida Console" panose="020B0609040504020204" pitchFamily="49" charset="0"/>
-              </a:rPr>
-              <a:t> </a:t>
-            </a:r>
-            <a:r>
-              <a:rPr lang="de-DE" sz="1800" dirty="0" err="1" smtClean="0">
-                <a:solidFill>
-                  <a:srgbClr val="0000FF"/>
-                </a:solidFill>
-                <a:latin typeface="Lucida Console" panose="020B0609040504020204" pitchFamily="49" charset="0"/>
-              </a:rPr>
-              <a:t>its</a:t>
-            </a:r>
-            <a:r>
-              <a:rPr lang="de-DE" sz="1800" dirty="0" smtClean="0">
-                <a:solidFill>
-                  <a:srgbClr val="0000FF"/>
-                </a:solidFill>
-                <a:latin typeface="Lucida Console" panose="020B0609040504020204" pitchFamily="49" charset="0"/>
-              </a:rPr>
-              <a:t> </a:t>
-            </a:r>
-            <a:r>
-              <a:rPr lang="de-DE" sz="1800" dirty="0" err="1" smtClean="0">
-                <a:solidFill>
-                  <a:srgbClr val="0000FF"/>
-                </a:solidFill>
-                <a:latin typeface="Lucida Console" panose="020B0609040504020204" pitchFamily="49" charset="0"/>
-              </a:rPr>
-              <a:t>attribute</a:t>
-            </a:r>
-            <a:r>
-              <a:rPr lang="de-DE" sz="1800" dirty="0" smtClean="0">
-                <a:solidFill>
-                  <a:srgbClr val="0000FF"/>
-                </a:solidFill>
-                <a:latin typeface="Lucida Console" panose="020B0609040504020204" pitchFamily="49" charset="0"/>
-              </a:rPr>
-              <a:t> </a:t>
-            </a:r>
-            <a:r>
-              <a:rPr lang="de-DE" sz="1800" dirty="0" err="1" smtClean="0">
-                <a:solidFill>
-                  <a:srgbClr val="0000FF"/>
-                </a:solidFill>
-                <a:latin typeface="Lucida Console" panose="020B0609040504020204" pitchFamily="49" charset="0"/>
-              </a:rPr>
-              <a:t>called</a:t>
-            </a:r>
-            <a:r>
-              <a:rPr lang="de-DE" sz="1800" dirty="0" smtClean="0">
-                <a:solidFill>
-                  <a:srgbClr val="0000FF"/>
-                </a:solidFill>
-                <a:latin typeface="Lucida Console" panose="020B0609040504020204" pitchFamily="49" charset="0"/>
-              </a:rPr>
-              <a:t> </a:t>
-            </a:r>
-            <a:r>
-              <a:rPr lang="de-DE" sz="1800" dirty="0" err="1" smtClean="0">
-                <a:solidFill>
-                  <a:srgbClr val="0000FF"/>
-                </a:solidFill>
-                <a:latin typeface="Lucida Console" panose="020B0609040504020204" pitchFamily="49" charset="0"/>
-              </a:rPr>
-              <a:t>main</a:t>
+              <a:t>Boolean.true</a:t>
             </a:r>
             <a:endParaRPr lang="de-DE" sz="1800" dirty="0" smtClean="0">
               <a:solidFill>
@@ -5169,46 +5116,46 @@
                 </a:solidFill>
                 <a:latin typeface="Lucida Console" panose="020B0609040504020204" pitchFamily="49" charset="0"/>
               </a:rPr>
-              <a:t>*/</a:t>
-            </a:r>
-          </a:p>
-          <a:p>
-            <a:r>
-              <a:rPr lang="de-DE" sz="1800" b="1" dirty="0" smtClean="0">
-                <a:solidFill>
-                  <a:srgbClr val="0000FF"/>
-                </a:solidFill>
-                <a:latin typeface="Lucida Console" panose="020B0609040504020204" pitchFamily="49" charset="0"/>
-              </a:rPr>
-              <a:t> </a:t>
-            </a:r>
-            <a:r>
-              <a:rPr lang="de-DE" sz="1800" b="1" dirty="0" err="1">
-                <a:solidFill>
-                  <a:srgbClr val="0000FF"/>
-                </a:solidFill>
-                <a:latin typeface="Lucida Console" panose="020B0609040504020204" pitchFamily="49" charset="0"/>
-              </a:rPr>
-              <a:t>o</a:t>
-            </a:r>
-            <a:r>
-              <a:rPr lang="de-DE" sz="1800" b="1" dirty="0" err="1" smtClean="0">
-                <a:solidFill>
-                  <a:srgbClr val="0000FF"/>
-                </a:solidFill>
-                <a:latin typeface="Lucida Console" panose="020B0609040504020204" pitchFamily="49" charset="0"/>
-              </a:rPr>
-              <a:t>bject</a:t>
-            </a:r>
-            <a:r>
-              <a:rPr lang="de-DE" sz="1800" b="1" dirty="0" smtClean="0">
-                <a:solidFill>
-                  <a:srgbClr val="0000FF"/>
-                </a:solidFill>
-                <a:latin typeface="Lucida Console" panose="020B0609040504020204" pitchFamily="49" charset="0"/>
-              </a:rPr>
-              <a:t> </a:t>
-            </a:r>
+              <a:t>  }.</a:t>
+            </a:r>
+            <a:r>
+              <a:rPr lang="de-DE" sz="1800" dirty="0" err="1" smtClean="0">
+                <a:solidFill>
+                  <a:srgbClr val="0000FF"/>
+                </a:solidFill>
+                <a:latin typeface="Lucida Console" panose="020B0609040504020204" pitchFamily="49" charset="0"/>
+              </a:rPr>
+              <a:t>activate</a:t>
+            </a:r>
+            <a:r>
+              <a:rPr lang="de-DE" sz="1800" dirty="0" smtClean="0">
+                <a:solidFill>
+                  <a:srgbClr val="0000FF"/>
+                </a:solidFill>
+                <a:latin typeface="Lucida Console" panose="020B0609040504020204" pitchFamily="49" charset="0"/>
+              </a:rPr>
+              <a:t> (</a:t>
+            </a:r>
+            <a:r>
+              <a:rPr lang="de-DE" sz="1800" dirty="0" err="1" smtClean="0">
+                <a:solidFill>
+                  <a:srgbClr val="0000FF"/>
+                </a:solidFill>
+                <a:latin typeface="Lucida Console" panose="020B0609040504020204" pitchFamily="49" charset="0"/>
+              </a:rPr>
+              <a:t>arguments</a:t>
+            </a:r>
+            <a:r>
+              <a:rPr lang="de-DE" sz="1800" dirty="0" smtClean="0">
+                <a:solidFill>
+                  <a:srgbClr val="0000FF"/>
+                </a:solidFill>
+                <a:latin typeface="Lucida Console" panose="020B0609040504020204" pitchFamily="49" charset="0"/>
+              </a:rPr>
+              <a:t>)</a:t>
+            </a:r>
+          </a:p>
+          <a:p>
             <a:r>
               <a:rPr lang="de-DE" sz="1800" dirty="0">
                 <a:solidFill>
@@ -5216,325 +5163,14 @@
                 </a:solidFill>
                 <a:latin typeface="Lucida Console" panose="020B0609040504020204" pitchFamily="49" charset="0"/>
               </a:rPr>
-              <a:t>{ </a:t>
-            </a:r>
-            <a:r>
-              <a:rPr lang="de-DE" sz="1800" dirty="0" smtClean="0">
-                <a:solidFill>
-                  <a:srgbClr val="0000FF"/>
-                </a:solidFill>
-                <a:latin typeface="Lucida Console" panose="020B0609040504020204" pitchFamily="49" charset="0"/>
-              </a:rPr>
-              <a:t> </a:t>
-            </a:r>
-          </a:p>
-          <a:p>
-            <a:r>
-              <a:rPr lang="de-DE" sz="1800" b="1" dirty="0">
-                <a:solidFill>
-                  <a:srgbClr val="0000FF"/>
-                </a:solidFill>
-                <a:latin typeface="Lucida Console" panose="020B0609040504020204" pitchFamily="49" charset="0"/>
-              </a:rPr>
-              <a:t> </a:t>
-            </a:r>
-            <a:r>
-              <a:rPr lang="de-DE" sz="1800" b="1" dirty="0" smtClean="0">
-                <a:solidFill>
-                  <a:srgbClr val="0000FF"/>
-                </a:solidFill>
-                <a:latin typeface="Lucida Console" panose="020B0609040504020204" pitchFamily="49" charset="0"/>
-              </a:rPr>
-              <a:t> </a:t>
-            </a:r>
-            <a:r>
-              <a:rPr lang="de-DE" sz="1800" b="1" dirty="0" err="1" smtClean="0">
-                <a:solidFill>
-                  <a:srgbClr val="0000FF"/>
-                </a:solidFill>
-                <a:latin typeface="Lucida Console" panose="020B0609040504020204" pitchFamily="49" charset="0"/>
-              </a:rPr>
-              <a:t>const</a:t>
-            </a:r>
-            <a:r>
-              <a:rPr lang="de-DE" sz="1800" b="1" dirty="0" smtClean="0">
-                <a:solidFill>
-                  <a:srgbClr val="0000FF"/>
-                </a:solidFill>
-                <a:latin typeface="Lucida Console" panose="020B0609040504020204" pitchFamily="49" charset="0"/>
-              </a:rPr>
-              <a:t> </a:t>
-            </a:r>
-            <a:r>
-              <a:rPr lang="de-DE" sz="1800" dirty="0" err="1" smtClean="0">
-                <a:solidFill>
-                  <a:srgbClr val="0000FF"/>
-                </a:solidFill>
-                <a:latin typeface="Lucida Console" panose="020B0609040504020204" pitchFamily="49" charset="0"/>
-              </a:rPr>
-              <a:t>main</a:t>
-            </a:r>
-            <a:r>
-              <a:rPr lang="de-DE" sz="1800" dirty="0" smtClean="0">
-                <a:solidFill>
-                  <a:srgbClr val="0000FF"/>
-                </a:solidFill>
-                <a:latin typeface="Lucida Console" panose="020B0609040504020204" pitchFamily="49" charset="0"/>
-              </a:rPr>
-              <a:t>: </a:t>
-            </a:r>
-            <a:r>
-              <a:rPr lang="de-DE" sz="1800" b="1" dirty="0" err="1" smtClean="0">
-                <a:solidFill>
-                  <a:srgbClr val="0000FF"/>
-                </a:solidFill>
-                <a:latin typeface="Lucida Console" panose="020B0609040504020204" pitchFamily="49" charset="0"/>
-              </a:rPr>
-              <a:t>rtn</a:t>
-            </a:r>
-            <a:r>
-              <a:rPr lang="de-DE" sz="1800" dirty="0" smtClean="0">
-                <a:solidFill>
-                  <a:srgbClr val="0000FF"/>
-                </a:solidFill>
-                <a:latin typeface="Lucida Console" panose="020B0609040504020204" pitchFamily="49" charset="0"/>
-              </a:rPr>
-              <a:t> (</a:t>
-            </a:r>
-            <a:r>
-              <a:rPr lang="de-DE" sz="1800" dirty="0" err="1" smtClean="0">
-                <a:solidFill>
-                  <a:srgbClr val="0000FF"/>
-                </a:solidFill>
-                <a:latin typeface="Lucida Console" panose="020B0609040504020204" pitchFamily="49" charset="0"/>
-              </a:rPr>
-              <a:t>args</a:t>
-            </a:r>
-            <a:r>
-              <a:rPr lang="de-DE" sz="1800" dirty="0" smtClean="0">
-                <a:solidFill>
-                  <a:srgbClr val="0000FF"/>
-                </a:solidFill>
-                <a:latin typeface="Lucida Console" panose="020B0609040504020204" pitchFamily="49" charset="0"/>
-              </a:rPr>
-              <a:t>:   Array&lt;String&gt;)</a:t>
-            </a:r>
-          </a:p>
-          <a:p>
-            <a:r>
-              <a:rPr lang="de-DE" sz="1800" dirty="0">
-                <a:solidFill>
-                  <a:srgbClr val="0000FF"/>
-                </a:solidFill>
-                <a:latin typeface="Lucida Console" panose="020B0609040504020204" pitchFamily="49" charset="0"/>
-              </a:rPr>
-              <a:t> </a:t>
-            </a:r>
-            <a:r>
-              <a:rPr lang="de-DE" sz="1800" dirty="0" smtClean="0">
-                <a:solidFill>
-                  <a:srgbClr val="0000FF"/>
-                </a:solidFill>
-                <a:latin typeface="Lucida Console" panose="020B0609040504020204" pitchFamily="49" charset="0"/>
-              </a:rPr>
-              <a:t> {</a:t>
-            </a:r>
-            <a:endParaRPr lang="de-DE" sz="1800" b="1" dirty="0" smtClean="0">
+              <a:t>)</a:t>
+            </a:r>
+            <a:endParaRPr lang="de-DE" sz="1800" dirty="0" smtClean="0">
               <a:solidFill>
                 <a:srgbClr val="0000FF"/>
               </a:solidFill>
               <a:latin typeface="Lucida Console" panose="020B0609040504020204" pitchFamily="49" charset="0"/>
             </a:endParaRPr>
-          </a:p>
-          <a:p>
-            <a:r>
-              <a:rPr lang="de-DE" sz="1800" b="1" dirty="0" smtClean="0">
-                <a:solidFill>
-                  <a:srgbClr val="0000FF"/>
-                </a:solidFill>
-                <a:latin typeface="Lucida Console" panose="020B0609040504020204" pitchFamily="49" charset="0"/>
-              </a:rPr>
-              <a:t>   </a:t>
-            </a:r>
-            <a:r>
-              <a:rPr lang="de-DE" sz="1800" b="1" dirty="0" err="1" smtClean="0">
-                <a:solidFill>
-                  <a:srgbClr val="0000FF"/>
-                </a:solidFill>
-                <a:latin typeface="Lucida Console" panose="020B0609040504020204" pitchFamily="49" charset="0"/>
-              </a:rPr>
-              <a:t>object</a:t>
-            </a:r>
-            <a:r>
-              <a:rPr lang="de-DE" sz="1800" b="1" dirty="0" smtClean="0">
-                <a:solidFill>
-                  <a:srgbClr val="0000FF"/>
-                </a:solidFill>
-                <a:latin typeface="Lucida Console" panose="020B0609040504020204" pitchFamily="49" charset="0"/>
-              </a:rPr>
-              <a:t> </a:t>
-            </a:r>
-            <a:r>
-              <a:rPr lang="de-DE" sz="1800" dirty="0">
-                <a:solidFill>
-                  <a:srgbClr val="0000FF"/>
-                </a:solidFill>
-                <a:latin typeface="Lucida Console" panose="020B0609040504020204" pitchFamily="49" charset="0"/>
-              </a:rPr>
-              <a:t>I</a:t>
-            </a:r>
-            <a:r>
-              <a:rPr lang="de-DE" sz="1800" dirty="0" smtClean="0">
-                <a:solidFill>
-                  <a:srgbClr val="0000FF"/>
-                </a:solidFill>
-                <a:latin typeface="Lucida Console" panose="020B0609040504020204" pitchFamily="49" charset="0"/>
-              </a:rPr>
-              <a:t>nteger.5</a:t>
-            </a:r>
-          </a:p>
-          <a:p>
-            <a:r>
-              <a:rPr lang="de-DE" sz="1800" b="1" dirty="0">
-                <a:solidFill>
-                  <a:srgbClr val="0000FF"/>
-                </a:solidFill>
-                <a:latin typeface="Lucida Console" panose="020B0609040504020204" pitchFamily="49" charset="0"/>
-              </a:rPr>
-              <a:t> </a:t>
-            </a:r>
-            <a:r>
-              <a:rPr lang="de-DE" sz="1800" b="1" dirty="0" smtClean="0">
-                <a:solidFill>
-                  <a:srgbClr val="0000FF"/>
-                </a:solidFill>
-                <a:latin typeface="Lucida Console" panose="020B0609040504020204" pitchFamily="49" charset="0"/>
-              </a:rPr>
-              <a:t>  </a:t>
-            </a:r>
-            <a:r>
-              <a:rPr lang="de-DE" sz="1800" b="1" dirty="0" err="1" smtClean="0">
-                <a:solidFill>
-                  <a:srgbClr val="0000FF"/>
-                </a:solidFill>
-                <a:latin typeface="Lucida Console" panose="020B0609040504020204" pitchFamily="49" charset="0"/>
-              </a:rPr>
-              <a:t>object</a:t>
-            </a:r>
-            <a:r>
-              <a:rPr lang="de-DE" sz="1800" b="1" dirty="0" smtClean="0">
-                <a:solidFill>
-                  <a:srgbClr val="0000FF"/>
-                </a:solidFill>
-                <a:latin typeface="Lucida Console" panose="020B0609040504020204" pitchFamily="49" charset="0"/>
-              </a:rPr>
-              <a:t> </a:t>
-            </a:r>
-            <a:r>
-              <a:rPr lang="de-DE" sz="1800" dirty="0" smtClean="0">
-                <a:solidFill>
-                  <a:srgbClr val="0000FF"/>
-                </a:solidFill>
-                <a:latin typeface="Lucida Console" panose="020B0609040504020204" pitchFamily="49" charset="0"/>
-              </a:rPr>
-              <a:t>Cardinal.5</a:t>
-            </a:r>
-          </a:p>
-          <a:p>
-            <a:r>
-              <a:rPr lang="de-DE" sz="1800" dirty="0" smtClean="0">
-                <a:solidFill>
-                  <a:srgbClr val="0000FF"/>
-                </a:solidFill>
-                <a:latin typeface="Lucida Console" panose="020B0609040504020204" pitchFamily="49" charset="0"/>
-              </a:rPr>
-              <a:t>   </a:t>
-            </a:r>
-            <a:r>
-              <a:rPr lang="de-DE" sz="1800" dirty="0" err="1" smtClean="0">
-                <a:solidFill>
-                  <a:srgbClr val="0000FF"/>
-                </a:solidFill>
-                <a:latin typeface="Lucida Console" panose="020B0609040504020204" pitchFamily="49" charset="0"/>
-              </a:rPr>
-              <a:t>Console.put</a:t>
-            </a:r>
-            <a:r>
-              <a:rPr lang="de-DE" sz="1800" dirty="0" smtClean="0">
-                <a:solidFill>
-                  <a:srgbClr val="0000FF"/>
-                </a:solidFill>
-                <a:latin typeface="Lucida Console" panose="020B0609040504020204" pitchFamily="49" charset="0"/>
-              </a:rPr>
-              <a:t> (</a:t>
-            </a:r>
-            <a:r>
-              <a:rPr lang="de-DE" sz="1800" b="1" dirty="0" err="1">
-                <a:solidFill>
-                  <a:srgbClr val="0000FF"/>
-                </a:solidFill>
-                <a:latin typeface="Lucida Console" panose="020B0609040504020204" pitchFamily="49" charset="0"/>
-              </a:rPr>
-              <a:t>object</a:t>
-            </a:r>
-            <a:r>
-              <a:rPr lang="de-DE" sz="1800" b="1" dirty="0">
-                <a:solidFill>
-                  <a:srgbClr val="0000FF"/>
-                </a:solidFill>
-                <a:latin typeface="Lucida Console" panose="020B0609040504020204" pitchFamily="49" charset="0"/>
-              </a:rPr>
-              <a:t> </a:t>
-            </a:r>
-            <a:r>
-              <a:rPr lang="de-DE" sz="1800" dirty="0" smtClean="0">
-                <a:solidFill>
-                  <a:srgbClr val="0000FF"/>
-                </a:solidFill>
-                <a:latin typeface="Lucida Console" panose="020B0609040504020204" pitchFamily="49" charset="0"/>
-              </a:rPr>
-              <a:t>Integer.5</a:t>
-            </a:r>
-            <a:r>
-              <a:rPr lang="de-DE" sz="1800" dirty="0">
-                <a:solidFill>
-                  <a:srgbClr val="0000FF"/>
-                </a:solidFill>
-                <a:latin typeface="Lucida Console" panose="020B0609040504020204" pitchFamily="49" charset="0"/>
-              </a:rPr>
-              <a:t>.+(Cardinal.5)</a:t>
-            </a:r>
-            <a:r>
-              <a:rPr lang="de-DE" sz="1800" dirty="0" smtClean="0">
-                <a:solidFill>
-                  <a:srgbClr val="0000FF"/>
-                </a:solidFill>
-                <a:latin typeface="Lucida Console" panose="020B0609040504020204" pitchFamily="49" charset="0"/>
-              </a:rPr>
-              <a:t>)</a:t>
-            </a:r>
-          </a:p>
-          <a:p>
-            <a:r>
-              <a:rPr lang="de-DE" sz="1800" dirty="0" smtClean="0">
-                <a:solidFill>
-                  <a:srgbClr val="0000FF"/>
-                </a:solidFill>
-                <a:latin typeface="Lucida Console" panose="020B0609040504020204" pitchFamily="49" charset="0"/>
-              </a:rPr>
-              <a:t>  }  </a:t>
-            </a:r>
-          </a:p>
-          <a:p>
-            <a:r>
-              <a:rPr lang="de-DE" sz="1800" dirty="0" smtClean="0">
-                <a:solidFill>
-                  <a:srgbClr val="0000FF"/>
-                </a:solidFill>
-                <a:latin typeface="Lucida Console" panose="020B0609040504020204" pitchFamily="49" charset="0"/>
-              </a:rPr>
-              <a:t> }</a:t>
-            </a:r>
           </a:p>
           <a:p>
             <a:endParaRPr lang="de-DE" sz="1800" dirty="0">
@@ -5749,29 +5385,18 @@
                 <a:latin typeface="Times New Roman" panose="02020603050405020304" pitchFamily="18" charset="0"/>
                 <a:cs typeface="Times New Roman" panose="02020603050405020304" pitchFamily="18" charset="0"/>
               </a:rPr>
-              <a:t>Activate (access, invoke, call, …) one of object </a:t>
-            </a:r>
+              <a:t>Activate (access, invoke, call, …) one of object attributes</a:t>
+            </a:r>
+          </a:p>
+          <a:p>
+            <a:pPr marL="1200150" lvl="1" indent="-457200" eaLnBrk="1" hangingPunct="1"/>
             <a:r>
               <a:rPr lang="en-US" altLang="ru-RU" sz="2400" dirty="0" smtClean="0">
                 <a:latin typeface="Times New Roman" panose="02020603050405020304" pitchFamily="18" charset="0"/>
                 <a:cs typeface="Times New Roman" panose="02020603050405020304" pitchFamily="18" charset="0"/>
               </a:rPr>
-              <a:t>attributes</a:t>
-            </a:r>
-          </a:p>
-          <a:p>
-            <a:pPr marL="1200150" lvl="1" indent="-457200" eaLnBrk="1" hangingPunct="1"/>
-            <a:r>
-              <a:rPr lang="en-US" altLang="ru-RU" sz="2400" dirty="0" smtClean="0">
-                <a:latin typeface="Times New Roman" panose="02020603050405020304" pitchFamily="18" charset="0"/>
-                <a:cs typeface="Times New Roman" panose="02020603050405020304" pitchFamily="18" charset="0"/>
-              </a:rPr>
               <a:t>Destroy</a:t>
             </a:r>
-            <a:endParaRPr lang="en-US" altLang="ru-RU" sz="2400" dirty="0" smtClean="0">
-              <a:latin typeface="Times New Roman" panose="02020603050405020304" pitchFamily="18" charset="0"/>
-              <a:cs typeface="Times New Roman" panose="02020603050405020304" pitchFamily="18" charset="0"/>
-            </a:endParaRPr>
           </a:p>
           <a:p>
             <a:pPr marL="457200" indent="-457200" eaLnBrk="1" hangingPunct="1"/>
@@ -5885,8 +5510,8 @@
         </p:nvSpPr>
         <p:spPr bwMode="auto">
           <a:xfrm>
-            <a:off x="6580746" y="1135164"/>
-            <a:ext cx="5238314" cy="5188293"/>
+            <a:off x="6235644" y="825780"/>
+            <a:ext cx="5583416" cy="5497677"/>
           </a:xfrm>
           <a:prstGeom prst="rect">
             <a:avLst/>
@@ -6014,22 +5639,13 @@
               <a:t> </a:t>
             </a:r>
             <a:r>
-              <a:rPr lang="de-DE" sz="1800" b="1" dirty="0" err="1">
-                <a:solidFill>
-                  <a:srgbClr val="0000FF"/>
-                </a:solidFill>
-                <a:latin typeface="Lucida Console" panose="020B0609040504020204" pitchFamily="49" charset="0"/>
-              </a:rPr>
-              <a:t>o</a:t>
-            </a:r>
-            <a:r>
               <a:rPr lang="de-DE" sz="1800" b="1" dirty="0" err="1" smtClean="0">
                 <a:solidFill>
                   <a:srgbClr val="0000FF"/>
                 </a:solidFill>
                 <a:latin typeface="Lucida Console" panose="020B0609040504020204" pitchFamily="49" charset="0"/>
               </a:rPr>
-              <a:t>bject</a:t>
+              <a:t>unit</a:t>
             </a:r>
             <a:r>
               <a:rPr lang="de-DE" sz="1800" b="1" dirty="0" smtClean="0">
@@ -6041,13 +5657,122 @@
               <a:t> </a:t>
             </a:r>
             <a:r>
+              <a:rPr lang="de-DE" sz="1800" dirty="0" err="1" smtClean="0">
+                <a:solidFill>
+                  <a:srgbClr val="0000FF"/>
+                </a:solidFill>
+                <a:latin typeface="Lucida Console" panose="020B0609040504020204" pitchFamily="49" charset="0"/>
+              </a:rPr>
+              <a:t>Unit</a:t>
+            </a:r>
+            <a:r>
+              <a:rPr lang="de-DE" sz="1800" dirty="0" err="1" smtClean="0">
+                <a:solidFill>
+                  <a:srgbClr val="0000FF"/>
+                </a:solidFill>
+                <a:latin typeface="Lucida Console" panose="020B0609040504020204" pitchFamily="49" charset="0"/>
+              </a:rPr>
+              <a:t>Type</a:t>
+            </a:r>
+            <a:r>
+              <a:rPr lang="de-DE" sz="1800" dirty="0" smtClean="0">
+                <a:solidFill>
+                  <a:srgbClr val="0000FF"/>
+                </a:solidFill>
+                <a:latin typeface="Lucida Console" panose="020B0609040504020204" pitchFamily="49" charset="0"/>
+              </a:rPr>
+              <a:t> {  </a:t>
+            </a:r>
+            <a:endParaRPr lang="de-DE" sz="1800" dirty="0" smtClean="0">
+              <a:solidFill>
+                <a:srgbClr val="0000FF"/>
+              </a:solidFill>
+              <a:latin typeface="Lucida Console" panose="020B0609040504020204" pitchFamily="49" charset="0"/>
+            </a:endParaRPr>
+          </a:p>
+          <a:p>
+            <a:r>
+              <a:rPr lang="de-DE" sz="1800" b="1" dirty="0">
+                <a:solidFill>
+                  <a:srgbClr val="0000FF"/>
+                </a:solidFill>
+                <a:latin typeface="Lucida Console" panose="020B0609040504020204" pitchFamily="49" charset="0"/>
+              </a:rPr>
+              <a:t> </a:t>
+            </a:r>
+            <a:r>
+              <a:rPr lang="de-DE" sz="1800" b="1" dirty="0" smtClean="0">
+                <a:solidFill>
+                  <a:srgbClr val="0000FF"/>
+                </a:solidFill>
+                <a:latin typeface="Lucida Console" panose="020B0609040504020204" pitchFamily="49" charset="0"/>
+              </a:rPr>
+              <a:t> </a:t>
+            </a:r>
+            <a:r>
+              <a:rPr lang="de-DE" sz="1800" b="1" dirty="0" smtClean="0">
+                <a:solidFill>
+                  <a:srgbClr val="0000FF"/>
+                </a:solidFill>
+                <a:latin typeface="Lucida Console" panose="020B0609040504020204" pitchFamily="49" charset="0"/>
+              </a:rPr>
+              <a:t> </a:t>
+            </a:r>
+            <a:r>
+              <a:rPr lang="de-DE" sz="1800" dirty="0" err="1" smtClean="0">
+                <a:solidFill>
+                  <a:srgbClr val="0000FF"/>
+                </a:solidFill>
+                <a:latin typeface="Lucida Console" panose="020B0609040504020204" pitchFamily="49" charset="0"/>
+              </a:rPr>
+              <a:t>routine</a:t>
+            </a:r>
+            <a:r>
+              <a:rPr lang="de-DE" sz="1800" dirty="0" smtClean="0">
+                <a:solidFill>
+                  <a:srgbClr val="0000FF"/>
+                </a:solidFill>
+                <a:latin typeface="Lucida Console" panose="020B0609040504020204" pitchFamily="49" charset="0"/>
+              </a:rPr>
+              <a:t> </a:t>
+            </a:r>
+            <a:r>
+              <a:rPr lang="de-DE" sz="1800" dirty="0" smtClean="0">
+                <a:solidFill>
+                  <a:srgbClr val="0000FF"/>
+                </a:solidFill>
+                <a:latin typeface="Lucida Console" panose="020B0609040504020204" pitchFamily="49" charset="0"/>
+              </a:rPr>
+              <a:t>(</a:t>
+            </a:r>
+            <a:r>
+              <a:rPr lang="de-DE" sz="1800" dirty="0" err="1" smtClean="0">
+                <a:solidFill>
+                  <a:srgbClr val="0000FF"/>
+                </a:solidFill>
+                <a:latin typeface="Lucida Console" panose="020B0609040504020204" pitchFamily="49" charset="0"/>
+              </a:rPr>
+              <a:t>parameter</a:t>
+            </a:r>
+            <a:r>
+              <a:rPr lang="de-DE" sz="1800" dirty="0" smtClean="0">
+                <a:solidFill>
+                  <a:srgbClr val="0000FF"/>
+                </a:solidFill>
+                <a:latin typeface="Lucida Console" panose="020B0609040504020204" pitchFamily="49" charset="0"/>
+              </a:rPr>
+              <a:t>: T1) {</a:t>
+            </a:r>
+          </a:p>
+          <a:p>
+            <a:r>
               <a:rPr lang="de-DE" sz="1800" dirty="0">
                 <a:solidFill>
                   <a:srgbClr val="0000FF"/>
                 </a:solidFill>
                 <a:latin typeface="Lucida Console" panose="020B0609040504020204" pitchFamily="49" charset="0"/>
               </a:rPr>
-              <a:t>{ </a:t>
+              <a:t> </a:t>
             </a:r>
             <a:r>
               <a:rPr lang="de-DE" sz="1800" dirty="0" smtClean="0">
@@ -6056,12 +5781,66 @@
                 </a:solidFill>
                 <a:latin typeface="Lucida Console" panose="020B0609040504020204" pitchFamily="49" charset="0"/>
               </a:rPr>
+              <a:t>    </a:t>
+            </a:r>
+            <a:r>
+              <a:rPr lang="de-DE" sz="1800" b="1" dirty="0" err="1" smtClean="0">
+                <a:solidFill>
+                  <a:srgbClr val="0000FF"/>
+                </a:solidFill>
+                <a:latin typeface="Lucida Console" panose="020B0609040504020204" pitchFamily="49" charset="0"/>
+              </a:rPr>
+              <a:t>var</a:t>
+            </a:r>
+            <a:r>
+              <a:rPr lang="de-DE" sz="1800" dirty="0" smtClean="0">
+                <a:solidFill>
+                  <a:srgbClr val="0000FF"/>
+                </a:solidFill>
+                <a:latin typeface="Lucida Console" panose="020B0609040504020204" pitchFamily="49" charset="0"/>
+              </a:rPr>
               <a:t> </a:t>
             </a:r>
-          </a:p>
-          <a:p>
-            <a:r>
-              <a:rPr lang="de-DE" sz="1800" b="1" dirty="0">
+            <a:r>
+              <a:rPr lang="de-DE" sz="1800" dirty="0" err="1" smtClean="0">
+                <a:solidFill>
+                  <a:srgbClr val="0000FF"/>
+                </a:solidFill>
+                <a:latin typeface="Lucida Console" panose="020B0609040504020204" pitchFamily="49" charset="0"/>
+              </a:rPr>
+              <a:t>localVar</a:t>
+            </a:r>
+            <a:r>
+              <a:rPr lang="de-DE" sz="1800" dirty="0" smtClean="0">
+                <a:solidFill>
+                  <a:srgbClr val="0000FF"/>
+                </a:solidFill>
+                <a:latin typeface="Lucida Console" panose="020B0609040504020204" pitchFamily="49" charset="0"/>
+              </a:rPr>
+              <a:t>: T2</a:t>
+            </a:r>
+          </a:p>
+          <a:p>
+            <a:r>
+              <a:rPr lang="de-DE" sz="1800" dirty="0" smtClean="0">
+                <a:solidFill>
+                  <a:srgbClr val="0000FF"/>
+                </a:solidFill>
+                <a:latin typeface="Lucida Console" panose="020B0609040504020204" pitchFamily="49" charset="0"/>
+              </a:rPr>
+              <a:t>     </a:t>
+            </a:r>
+            <a:r>
+              <a:rPr lang="de-DE" sz="1800" dirty="0" err="1" smtClean="0">
+                <a:solidFill>
+                  <a:srgbClr val="0000FF"/>
+                </a:solidFill>
+                <a:latin typeface="Lucida Console" panose="020B0609040504020204" pitchFamily="49" charset="0"/>
+              </a:rPr>
+              <a:t>localConst</a:t>
+            </a:r>
+            <a:r>
+              <a:rPr lang="de-DE" sz="1800" dirty="0" smtClean="0">
                 <a:solidFill>
                   <a:srgbClr val="0000FF"/>
                 </a:solidFill>
@@ -6070,7 +5849,16 @@
               <a:t> </a:t>
             </a:r>
             <a:r>
-              <a:rPr lang="de-DE" sz="1800" b="1" dirty="0" smtClean="0">
+              <a:rPr lang="de-DE" sz="1800" b="1" dirty="0" err="1" smtClean="0">
+                <a:solidFill>
+                  <a:srgbClr val="0000FF"/>
+                </a:solidFill>
+                <a:latin typeface="Lucida Console" panose="020B0609040504020204" pitchFamily="49" charset="0"/>
+              </a:rPr>
+              <a:t>is</a:t>
+            </a:r>
+            <a:r>
+              <a:rPr lang="de-DE" sz="1800" dirty="0" smtClean="0">
                 <a:solidFill>
                   <a:srgbClr val="0000FF"/>
                 </a:solidFill>
@@ -6085,25 +5873,7 @@
                 </a:solidFill>
                 <a:latin typeface="Lucida Console" panose="020B0609040504020204" pitchFamily="49" charset="0"/>
               </a:rPr>
-              <a:t>const</a:t>
-            </a:r>
-            <a:r>
-              <a:rPr lang="de-DE" sz="1800" b="1" dirty="0" smtClean="0">
-                <a:solidFill>
-                  <a:srgbClr val="0000FF"/>
-                </a:solidFill>
-                <a:latin typeface="Lucida Console" panose="020B0609040504020204" pitchFamily="49" charset="0"/>
-              </a:rPr>
-              <a:t> </a:t>
-            </a:r>
-            <a:r>
-              <a:rPr lang="de-DE" sz="1800" dirty="0" err="1" smtClean="0">
-                <a:solidFill>
-                  <a:srgbClr val="0000FF"/>
-                </a:solidFill>
-                <a:latin typeface="Lucida Console" panose="020B0609040504020204" pitchFamily="49" charset="0"/>
-              </a:rPr>
-              <a:t>main</a:t>
+              <a:t>new</a:t>
             </a:r>
             <a:r>
               <a:rPr lang="de-DE" sz="1800" dirty="0" smtClean="0">
@@ -6112,63 +5882,7 @@
                 </a:solidFill>
                 <a:latin typeface="Lucida Console" panose="020B0609040504020204" pitchFamily="49" charset="0"/>
               </a:rPr>
-              <a:t>: </a:t>
-            </a:r>
-            <a:r>
-              <a:rPr lang="de-DE" sz="1800" b="1" dirty="0" err="1" smtClean="0">
-                <a:solidFill>
-                  <a:srgbClr val="0000FF"/>
-                </a:solidFill>
-                <a:latin typeface="Lucida Console" panose="020B0609040504020204" pitchFamily="49" charset="0"/>
-              </a:rPr>
-              <a:t>rtn</a:t>
-            </a:r>
-            <a:r>
-              <a:rPr lang="de-DE" sz="1800" dirty="0" smtClean="0">
-                <a:solidFill>
-                  <a:srgbClr val="0000FF"/>
-                </a:solidFill>
-                <a:latin typeface="Lucida Console" panose="020B0609040504020204" pitchFamily="49" charset="0"/>
-              </a:rPr>
-              <a:t> (</a:t>
-            </a:r>
-            <a:r>
-              <a:rPr lang="de-DE" sz="1800" dirty="0" err="1" smtClean="0">
-                <a:solidFill>
-                  <a:srgbClr val="0000FF"/>
-                </a:solidFill>
-                <a:latin typeface="Lucida Console" panose="020B0609040504020204" pitchFamily="49" charset="0"/>
-              </a:rPr>
-              <a:t>args</a:t>
-            </a:r>
-            <a:r>
-              <a:rPr lang="de-DE" sz="1800" dirty="0" smtClean="0">
-                <a:solidFill>
-                  <a:srgbClr val="0000FF"/>
-                </a:solidFill>
-                <a:latin typeface="Lucida Console" panose="020B0609040504020204" pitchFamily="49" charset="0"/>
-              </a:rPr>
-              <a:t>:   Array&lt;String&gt;)</a:t>
-            </a:r>
-          </a:p>
-          <a:p>
-            <a:r>
-              <a:rPr lang="de-DE" sz="1800" dirty="0">
-                <a:solidFill>
-                  <a:srgbClr val="0000FF"/>
-                </a:solidFill>
-                <a:latin typeface="Lucida Console" panose="020B0609040504020204" pitchFamily="49" charset="0"/>
-              </a:rPr>
-              <a:t> </a:t>
-            </a:r>
-            <a:r>
-              <a:rPr lang="de-DE" sz="1800" dirty="0" smtClean="0">
-                <a:solidFill>
-                  <a:srgbClr val="0000FF"/>
-                </a:solidFill>
-                <a:latin typeface="Lucida Console" panose="020B0609040504020204" pitchFamily="49" charset="0"/>
-              </a:rPr>
-              <a:t> {</a:t>
+              <a:t> T2 </a:t>
             </a:r>
             <a:endParaRPr lang="de-DE" sz="1800" b="1" dirty="0" smtClean="0">
               <a:solidFill>
@@ -6179,13 +5893,80 @@
           </a:p>
           <a:p>
             <a:r>
-              <a:rPr lang="de-DE" sz="1800" b="1" dirty="0" smtClean="0">
-                <a:solidFill>
-                  <a:srgbClr val="0000FF"/>
-                </a:solidFill>
-                <a:latin typeface="Lucida Console" panose="020B0609040504020204" pitchFamily="49" charset="0"/>
-              </a:rPr>
-              <a:t>   </a:t>
+              <a:rPr lang="de-DE" sz="1800" dirty="0" smtClean="0">
+                <a:solidFill>
+                  <a:srgbClr val="0000FF"/>
+                </a:solidFill>
+                <a:latin typeface="Lucida Console" panose="020B0609040504020204" pitchFamily="49" charset="0"/>
+              </a:rPr>
+              <a:t>   }</a:t>
+            </a:r>
+          </a:p>
+          <a:p>
+            <a:r>
+              <a:rPr lang="de-DE" sz="1800" dirty="0">
+                <a:solidFill>
+                  <a:srgbClr val="0000FF"/>
+                </a:solidFill>
+                <a:latin typeface="Lucida Console" panose="020B0609040504020204" pitchFamily="49" charset="0"/>
+              </a:rPr>
+              <a:t> </a:t>
+            </a:r>
+            <a:r>
+              <a:rPr lang="de-DE" sz="1800" dirty="0" smtClean="0">
+                <a:solidFill>
+                  <a:srgbClr val="0000FF"/>
+                </a:solidFill>
+                <a:latin typeface="Lucida Console" panose="020B0609040504020204" pitchFamily="49" charset="0"/>
+              </a:rPr>
+              <a:t>  </a:t>
+            </a:r>
+            <a:r>
+              <a:rPr lang="de-DE" sz="1800" dirty="0" err="1" smtClean="0">
+                <a:solidFill>
+                  <a:srgbClr val="0000FF"/>
+                </a:solidFill>
+                <a:latin typeface="Lucida Console" panose="020B0609040504020204" pitchFamily="49" charset="0"/>
+              </a:rPr>
+              <a:t>objectVarAttr</a:t>
+            </a:r>
+            <a:r>
+              <a:rPr lang="de-DE" sz="1800" dirty="0" smtClean="0">
+                <a:solidFill>
+                  <a:srgbClr val="0000FF"/>
+                </a:solidFill>
+                <a:latin typeface="Lucida Console" panose="020B0609040504020204" pitchFamily="49" charset="0"/>
+              </a:rPr>
+              <a:t>: T3</a:t>
+            </a:r>
+          </a:p>
+          <a:p>
+            <a:r>
+              <a:rPr lang="de-DE" sz="1800" dirty="0">
+                <a:solidFill>
+                  <a:srgbClr val="0000FF"/>
+                </a:solidFill>
+                <a:latin typeface="Lucida Console" panose="020B0609040504020204" pitchFamily="49" charset="0"/>
+              </a:rPr>
+              <a:t> </a:t>
+            </a:r>
+            <a:r>
+              <a:rPr lang="de-DE" sz="1800" dirty="0" smtClean="0">
+                <a:solidFill>
+                  <a:srgbClr val="0000FF"/>
+                </a:solidFill>
+                <a:latin typeface="Lucida Console" panose="020B0609040504020204" pitchFamily="49" charset="0"/>
+              </a:rPr>
+              <a:t> </a:t>
+            </a:r>
+            <a:r>
+              <a:rPr lang="de-DE" sz="1800" dirty="0" smtClean="0">
+                <a:solidFill>
+                  <a:srgbClr val="0000FF"/>
+                </a:solidFill>
+                <a:latin typeface="Lucida Console" panose="020B0609040504020204" pitchFamily="49" charset="0"/>
+              </a:rPr>
+              <a:t> </a:t>
             </a:r>
             <a:r>
               <a:rPr lang="de-DE" sz="1800" b="1" dirty="0" err="1" smtClean="0">
@@ -6194,10 +5975,10 @@
                 </a:solidFill>
                 <a:latin typeface="Lucida Console" panose="020B0609040504020204" pitchFamily="49" charset="0"/>
               </a:rPr>
-              <a:t>object</a:t>
-            </a:r>
-            <a:r>
-              <a:rPr lang="de-DE" sz="1800" b="1" dirty="0" smtClean="0">
+              <a:t>const</a:t>
+            </a:r>
+            <a:r>
+              <a:rPr lang="de-DE" sz="1800" dirty="0" smtClean="0">
                 <a:solidFill>
                   <a:srgbClr val="0000FF"/>
                 </a:solidFill>
@@ -6206,13 +5987,13 @@
               <a:t> </a:t>
             </a:r>
             <a:r>
-              <a:rPr lang="de-DE" sz="1800" dirty="0">
-                <a:solidFill>
-                  <a:srgbClr val="0000FF"/>
-                </a:solidFill>
-                <a:latin typeface="Lucida Console" panose="020B0609040504020204" pitchFamily="49" charset="0"/>
-              </a:rPr>
-              <a:t>I</a:t>
+              <a:rPr lang="de-DE" sz="1800" dirty="0" err="1" smtClean="0">
+                <a:solidFill>
+                  <a:srgbClr val="0000FF"/>
+                </a:solidFill>
+                <a:latin typeface="Lucida Console" panose="020B0609040504020204" pitchFamily="49" charset="0"/>
+              </a:rPr>
+              <a:t>objectConstAttr</a:t>
             </a:r>
             <a:r>
               <a:rPr lang="de-DE" sz="1800" dirty="0" smtClean="0">
@@ -6221,39 +6002,19 @@
                 </a:solidFill>
                 <a:latin typeface="Lucida Console" panose="020B0609040504020204" pitchFamily="49" charset="0"/>
               </a:rPr>
-              <a:t>nteger.5</a:t>
-            </a:r>
-          </a:p>
-          <a:p>
-            <a:r>
-              <a:rPr lang="de-DE" sz="1800" b="1" dirty="0">
-                <a:solidFill>
-                  <a:srgbClr val="0000FF"/>
-                </a:solidFill>
-                <a:latin typeface="Lucida Console" panose="020B0609040504020204" pitchFamily="49" charset="0"/>
-              </a:rPr>
               <a:t> </a:t>
             </a:r>
             <a:r>
-              <a:rPr lang="de-DE" sz="1800" b="1" dirty="0" smtClean="0">
-                <a:solidFill>
-                  <a:srgbClr val="0000FF"/>
-                </a:solidFill>
-                <a:latin typeface="Lucida Console" panose="020B0609040504020204" pitchFamily="49" charset="0"/>
-              </a:rPr>
-              <a:t>  </a:t>
-            </a:r>
-            <a:r>
               <a:rPr lang="de-DE" sz="1800" b="1" dirty="0" err="1" smtClean="0">
                 <a:solidFill>
                   <a:srgbClr val="0000FF"/>
                 </a:solidFill>
                 <a:latin typeface="Lucida Console" panose="020B0609040504020204" pitchFamily="49" charset="0"/>
               </a:rPr>
-              <a:t>object</a:t>
-            </a:r>
-            <a:r>
-              <a:rPr lang="de-DE" sz="1800" b="1" dirty="0" smtClean="0">
+              <a:t>is</a:t>
+            </a:r>
+            <a:r>
+              <a:rPr lang="de-DE" sz="1800" dirty="0" smtClean="0">
                 <a:solidFill>
                   <a:srgbClr val="0000FF"/>
                 </a:solidFill>
@@ -6262,13 +6023,22 @@
               <a:t> </a:t>
             </a:r>
             <a:r>
+              <a:rPr lang="de-DE" sz="1800" b="1" dirty="0" err="1" smtClean="0">
+                <a:solidFill>
+                  <a:srgbClr val="0000FF"/>
+                </a:solidFill>
+                <a:latin typeface="Lucida Console" panose="020B0609040504020204" pitchFamily="49" charset="0"/>
+              </a:rPr>
+              <a:t>new</a:t>
+            </a:r>
+            <a:r>
               <a:rPr lang="de-DE" sz="1800" dirty="0" smtClean="0">
                 <a:solidFill>
                   <a:srgbClr val="0000FF"/>
                 </a:solidFill>
                 <a:latin typeface="Lucida Console" panose="020B0609040504020204" pitchFamily="49" charset="0"/>
               </a:rPr>
-              <a:t>Cardinal.5</a:t>
+              <a:t> T3</a:t>
             </a:r>
           </a:p>
           <a:p>
@@ -6279,16 +6049,7 @@
                 </a:solidFill>
                 <a:latin typeface="Lucida Console" panose="020B0609040504020204" pitchFamily="49" charset="0"/>
               </a:rPr>
-              <a:t>   </a:t>
-            </a:r>
-            <a:r>
-              <a:rPr lang="de-DE" sz="1800" dirty="0" err="1" smtClean="0">
-                <a:solidFill>
-                  <a:srgbClr val="0000FF"/>
-                </a:solidFill>
-                <a:latin typeface="Lucida Console" panose="020B0609040504020204" pitchFamily="49" charset="0"/>
-              </a:rPr>
-              <a:t>Console.put</a:t>
+              <a:t> </a:t>
             </a:r>
             <a:r>
               <a:rPr lang="de-DE" sz="1800" dirty="0" smtClean="0">
@@ -6297,19 +6058,12 @@
                 </a:solidFill>
                 <a:latin typeface="Lucida Console" panose="020B0609040504020204" pitchFamily="49" charset="0"/>
               </a:rPr>
-              <a:t> (</a:t>
-            </a:r>
-            <a:r>
-              <a:rPr lang="de-DE" sz="1800" b="1" dirty="0" err="1">
-                <a:solidFill>
-                  <a:srgbClr val="0000FF"/>
-                </a:solidFill>
-                <a:latin typeface="Lucida Console" panose="020B0609040504020204" pitchFamily="49" charset="0"/>
-              </a:rPr>
-              <a:t>object</a:t>
-            </a:r>
-            <a:r>
-              <a:rPr lang="de-DE" sz="1800" b="1" dirty="0">
+              <a:t>}</a:t>
+            </a:r>
+          </a:p>
+          <a:p>
+            <a:r>
+              <a:rPr lang="de-DE" sz="1800" dirty="0" smtClean="0">
                 <a:solidFill>
                   <a:srgbClr val="0000FF"/>
                 </a:solidFill>
@@ -6317,57 +6071,6 @@
               </a:rPr>
               <a:t> </a:t>
             </a:r>
-            <a:r>
-              <a:rPr lang="de-DE" sz="1800" dirty="0" smtClean="0">
-                <a:solidFill>
-                  <a:srgbClr val="0000FF"/>
-                </a:solidFill>
-                <a:latin typeface="Lucida Console" panose="020B0609040504020204" pitchFamily="49" charset="0"/>
-              </a:rPr>
-              <a:t>Integer.5</a:t>
-            </a:r>
-            <a:r>
-              <a:rPr lang="de-DE" sz="1800" dirty="0">
-                <a:solidFill>
-                  <a:srgbClr val="0000FF"/>
-                </a:solidFill>
-                <a:latin typeface="Lucida Console" panose="020B0609040504020204" pitchFamily="49" charset="0"/>
-              </a:rPr>
-              <a:t>.+(Cardinal.5)</a:t>
-            </a:r>
-            <a:r>
-              <a:rPr lang="de-DE" sz="1800" dirty="0" smtClean="0">
-                <a:solidFill>
-                  <a:srgbClr val="0000FF"/>
-                </a:solidFill>
-                <a:latin typeface="Lucida Console" panose="020B0609040504020204" pitchFamily="49" charset="0"/>
-              </a:rPr>
-              <a:t>)</a:t>
-            </a:r>
-          </a:p>
-          <a:p>
-            <a:r>
-              <a:rPr lang="de-DE" sz="1800" dirty="0" smtClean="0">
-                <a:solidFill>
-                  <a:srgbClr val="0000FF"/>
-                </a:solidFill>
-                <a:latin typeface="Lucida Console" panose="020B0609040504020204" pitchFamily="49" charset="0"/>
-              </a:rPr>
-              <a:t>  }</a:t>
-            </a:r>
-          </a:p>
-          <a:p>
-            <a:r>
-              <a:rPr lang="de-DE" sz="1800" dirty="0" smtClean="0">
-                <a:solidFill>
-                  <a:srgbClr val="0000FF"/>
-                </a:solidFill>
-                <a:latin typeface="Lucida Console" panose="020B0609040504020204" pitchFamily="49" charset="0"/>
-              </a:rPr>
-              <a:t> }</a:t>
-            </a:r>
-          </a:p>
-          <a:p>
             <a:endParaRPr lang="de-DE" sz="1800" dirty="0">
               <a:solidFill>
                 <a:srgbClr val="0000FF"/>
@@ -6387,8 +6090,8 @@
         </p:nvSpPr>
         <p:spPr bwMode="auto">
           <a:xfrm>
-            <a:off x="86070" y="682258"/>
-            <a:ext cx="6277491" cy="9485674"/>
+            <a:off x="86070" y="553356"/>
+            <a:ext cx="6277491" cy="5681555"/>
           </a:xfrm>
           <a:prstGeom prst="rect">
             <a:avLst/>
@@ -6591,7 +6294,14 @@
                 <a:latin typeface="Times New Roman" panose="02020603050405020304" pitchFamily="18" charset="0"/>
                 <a:cs typeface="Times New Roman" panose="02020603050405020304" pitchFamily="18" charset="0"/>
               </a:rPr>
-              <a:t>Routine attributes – local attributes</a:t>
+              <a:t>Routine attributes – local </a:t>
+            </a:r>
+            <a:r>
+              <a:rPr lang="en-US" altLang="ru-RU" sz="2400" dirty="0" smtClean="0">
+                <a:latin typeface="Times New Roman" panose="02020603050405020304" pitchFamily="18" charset="0"/>
+                <a:cs typeface="Times New Roman" panose="02020603050405020304" pitchFamily="18" charset="0"/>
+              </a:rPr>
+              <a:t>attributes – parameters and all local variables and constants</a:t>
             </a:r>
             <a:endParaRPr lang="en-US" altLang="ru-RU" sz="2400" dirty="0" smtClean="0">
               <a:latin typeface="Times New Roman" panose="02020603050405020304" pitchFamily="18" charset="0"/>
@@ -6605,19 +6315,28 @@
                 <a:latin typeface="Times New Roman" panose="02020603050405020304" pitchFamily="18" charset="0"/>
                 <a:cs typeface="Times New Roman" panose="02020603050405020304" pitchFamily="18" charset="0"/>
               </a:rPr>
-              <a:t>What is the </a:t>
-            </a:r>
+              <a:t>What is the unique characteristic of an attribute?</a:t>
+            </a:r>
+          </a:p>
+          <a:p>
+            <a:pPr marL="1200150" lvl="1" indent="-457200" eaLnBrk="1" hangingPunct="1"/>
+            <a:r>
+              <a:rPr lang="en-US" altLang="ru-RU" sz="2400" dirty="0" smtClean="0">
+                <a:latin typeface="Times New Roman" panose="02020603050405020304" pitchFamily="18" charset="0"/>
+                <a:cs typeface="Times New Roman" panose="02020603050405020304" pitchFamily="18" charset="0"/>
+              </a:rPr>
+              <a:t>Name</a:t>
+            </a:r>
+          </a:p>
+          <a:p>
+            <a:pPr marL="457200" indent="-457200" eaLnBrk="1" hangingPunct="1"/>
             <a:r>
               <a:rPr lang="en-US" altLang="ru-RU" sz="2800" dirty="0" smtClean="0">
                 <a:latin typeface="Times New Roman" panose="02020603050405020304" pitchFamily="18" charset="0"/>
                 <a:cs typeface="Times New Roman" panose="02020603050405020304" pitchFamily="18" charset="0"/>
               </a:rPr>
-              <a:t>unique characteristic of an attribute?</a:t>
-            </a:r>
-            <a:endParaRPr lang="en-US" altLang="ru-RU" sz="2800" dirty="0" smtClean="0">
-              <a:latin typeface="Times New Roman" panose="02020603050405020304" pitchFamily="18" charset="0"/>
-              <a:cs typeface="Times New Roman" panose="02020603050405020304" pitchFamily="18" charset="0"/>
-            </a:endParaRPr>
+              <a:t>Does attribute has a type?</a:t>
+            </a:r>
           </a:p>
           <a:p>
             <a:pPr marL="1200150" lvl="1" indent="-457200" eaLnBrk="1" hangingPunct="1"/>
@@ -6626,134 +6345,7 @@
                 <a:latin typeface="Times New Roman" panose="02020603050405020304" pitchFamily="18" charset="0"/>
                 <a:cs typeface="Times New Roman" panose="02020603050405020304" pitchFamily="18" charset="0"/>
               </a:rPr>
-              <a:t>Name</a:t>
-            </a:r>
-            <a:endParaRPr lang="en-US" altLang="ru-RU" sz="2400" dirty="0" smtClean="0">
-              <a:latin typeface="Times New Roman" panose="02020603050405020304" pitchFamily="18" charset="0"/>
-              <a:cs typeface="Times New Roman" panose="02020603050405020304" pitchFamily="18" charset="0"/>
-            </a:endParaRPr>
-          </a:p>
-          <a:p>
-            <a:pPr marL="457200" indent="-457200" eaLnBrk="1" hangingPunct="1"/>
-            <a:r>
-              <a:rPr lang="en-US" altLang="ru-RU" sz="2800" dirty="0" smtClean="0">
-                <a:latin typeface="Times New Roman" panose="02020603050405020304" pitchFamily="18" charset="0"/>
-                <a:cs typeface="Times New Roman" panose="02020603050405020304" pitchFamily="18" charset="0"/>
-              </a:rPr>
-              <a:t>Does </a:t>
-            </a:r>
-            <a:r>
-              <a:rPr lang="en-US" altLang="ru-RU" sz="2800" dirty="0" smtClean="0">
-                <a:latin typeface="Times New Roman" panose="02020603050405020304" pitchFamily="18" charset="0"/>
-                <a:cs typeface="Times New Roman" panose="02020603050405020304" pitchFamily="18" charset="0"/>
-              </a:rPr>
-              <a:t>attribute has a type</a:t>
-            </a:r>
-            <a:r>
-              <a:rPr lang="en-US" altLang="ru-RU" sz="2800" dirty="0" smtClean="0">
-                <a:latin typeface="Times New Roman" panose="02020603050405020304" pitchFamily="18" charset="0"/>
-                <a:cs typeface="Times New Roman" panose="02020603050405020304" pitchFamily="18" charset="0"/>
-              </a:rPr>
-              <a:t>?</a:t>
-            </a:r>
-          </a:p>
-          <a:p>
-            <a:pPr marL="1200150" lvl="1" indent="-457200" eaLnBrk="1" hangingPunct="1"/>
-            <a:r>
-              <a:rPr lang="en-US" altLang="ru-RU" sz="2400" dirty="0" smtClean="0">
-                <a:latin typeface="Times New Roman" panose="02020603050405020304" pitchFamily="18" charset="0"/>
-                <a:cs typeface="Times New Roman" panose="02020603050405020304" pitchFamily="18" charset="0"/>
-              </a:rPr>
               <a:t>Yes</a:t>
-            </a:r>
-            <a:endParaRPr lang="en-US" altLang="ru-RU" sz="2400" dirty="0" smtClean="0">
-              <a:latin typeface="Times New Roman" panose="02020603050405020304" pitchFamily="18" charset="0"/>
-              <a:cs typeface="Times New Roman" panose="02020603050405020304" pitchFamily="18" charset="0"/>
-            </a:endParaRPr>
-          </a:p>
-          <a:p>
-            <a:pPr marL="457200" indent="-457200" eaLnBrk="1" hangingPunct="1"/>
-            <a:r>
-              <a:rPr lang="en-US" altLang="ru-RU" sz="2800" dirty="0" smtClean="0">
-                <a:latin typeface="Times New Roman" panose="02020603050405020304" pitchFamily="18" charset="0"/>
-                <a:cs typeface="Times New Roman" panose="02020603050405020304" pitchFamily="18" charset="0"/>
-              </a:rPr>
-              <a:t>Attribute may be of reference or value kind</a:t>
-            </a:r>
-          </a:p>
-          <a:p>
-            <a:pPr marL="457200" indent="-457200" eaLnBrk="1" hangingPunct="1"/>
-            <a:r>
-              <a:rPr lang="en-US" altLang="ru-RU" sz="2800" dirty="0" smtClean="0">
-                <a:latin typeface="Times New Roman" panose="02020603050405020304" pitchFamily="18" charset="0"/>
-                <a:cs typeface="Times New Roman" panose="02020603050405020304" pitchFamily="18" charset="0"/>
-              </a:rPr>
-              <a:t>Attribute can be variable (mutable) or constant (immutable) (shallow or deep)</a:t>
-            </a:r>
-          </a:p>
-          <a:p>
-            <a:pPr marL="457200" indent="-457200" eaLnBrk="1" hangingPunct="1"/>
-            <a:r>
-              <a:rPr lang="en-US" altLang="ru-RU" sz="2800" dirty="0" smtClean="0">
-                <a:latin typeface="Times New Roman" panose="02020603050405020304" pitchFamily="18" charset="0"/>
-                <a:cs typeface="Times New Roman" panose="02020603050405020304" pitchFamily="18" charset="0"/>
-              </a:rPr>
-              <a:t>Which </a:t>
-            </a:r>
-            <a:r>
-              <a:rPr lang="en-US" altLang="ru-RU" sz="2800" dirty="0" smtClean="0">
-                <a:latin typeface="Times New Roman" panose="02020603050405020304" pitchFamily="18" charset="0"/>
-                <a:cs typeface="Times New Roman" panose="02020603050405020304" pitchFamily="18" charset="0"/>
-              </a:rPr>
-              <a:t>operations can be applied to  objects?</a:t>
-            </a:r>
-          </a:p>
-          <a:p>
-            <a:pPr marL="1200150" lvl="1" indent="-457200" eaLnBrk="1" hangingPunct="1"/>
-            <a:r>
-              <a:rPr lang="en-US" altLang="ru-RU" sz="2400" dirty="0" smtClean="0">
-                <a:latin typeface="Times New Roman" panose="02020603050405020304" pitchFamily="18" charset="0"/>
-                <a:cs typeface="Times New Roman" panose="02020603050405020304" pitchFamily="18" charset="0"/>
-              </a:rPr>
-              <a:t>Attach to an object</a:t>
-            </a:r>
-          </a:p>
-          <a:p>
-            <a:pPr marL="1200150" lvl="1" indent="-457200" eaLnBrk="1" hangingPunct="1"/>
-            <a:r>
-              <a:rPr lang="en-US" altLang="ru-RU" sz="2400" dirty="0" smtClean="0">
-                <a:latin typeface="Times New Roman" panose="02020603050405020304" pitchFamily="18" charset="0"/>
-                <a:cs typeface="Times New Roman" panose="02020603050405020304" pitchFamily="18" charset="0"/>
-              </a:rPr>
-              <a:t>Detach from</a:t>
-            </a:r>
-            <a:endParaRPr lang="en-US" altLang="ru-RU" sz="2400" dirty="0" smtClean="0">
-              <a:latin typeface="Times New Roman" panose="02020603050405020304" pitchFamily="18" charset="0"/>
-              <a:cs typeface="Times New Roman" panose="02020603050405020304" pitchFamily="18" charset="0"/>
-            </a:endParaRPr>
-          </a:p>
-          <a:p>
-            <a:pPr marL="1200150" lvl="1" indent="-457200" eaLnBrk="1" hangingPunct="1"/>
-            <a:r>
-              <a:rPr lang="en-US" altLang="ru-RU" sz="2400" dirty="0" smtClean="0">
-                <a:latin typeface="Times New Roman" panose="02020603050405020304" pitchFamily="18" charset="0"/>
-                <a:cs typeface="Times New Roman" panose="02020603050405020304" pitchFamily="18" charset="0"/>
-              </a:rPr>
-              <a:t>Activate </a:t>
-            </a:r>
-            <a:r>
-              <a:rPr lang="en-US" altLang="ru-RU" sz="2400" dirty="0" smtClean="0">
-                <a:latin typeface="Times New Roman" panose="02020603050405020304" pitchFamily="18" charset="0"/>
-                <a:cs typeface="Times New Roman" panose="02020603050405020304" pitchFamily="18" charset="0"/>
-              </a:rPr>
-              <a:t>(access, invoke, call, …) one of </a:t>
-            </a:r>
-            <a:r>
-              <a:rPr lang="en-US" altLang="ru-RU" sz="2400" dirty="0" smtClean="0">
-                <a:latin typeface="Times New Roman" panose="02020603050405020304" pitchFamily="18" charset="0"/>
-                <a:cs typeface="Times New Roman" panose="02020603050405020304" pitchFamily="18" charset="0"/>
-              </a:rPr>
-              <a:t>attached object attributes</a:t>
             </a:r>
             <a:endParaRPr lang="en-US" altLang="ru-RU" sz="2400" dirty="0" smtClean="0">
               <a:latin typeface="Times New Roman" panose="02020603050405020304" pitchFamily="18" charset="0"/>
@@ -6770,7 +6362,7 @@
         </p:nvSpPr>
         <p:spPr>
           <a:xfrm>
-            <a:off x="1943364" y="0"/>
+            <a:off x="1943364" y="-25628"/>
             <a:ext cx="8441012" cy="707886"/>
           </a:xfrm>
           <a:prstGeom prst="rect">
@@ -6786,13 +6378,13 @@
           <a:p>
             <a:pPr algn="ctr"/>
             <a:r>
-              <a:rPr lang="en-US" sz="4000" b="1" dirty="0">
+              <a:rPr lang="en-US" sz="4000" b="1" dirty="0" smtClean="0">
                 <a:solidFill>
                   <a:srgbClr val="CC6600"/>
                 </a:solidFill>
                 <a:latin typeface="Comic Sans MS" panose="030F0702030302020204" pitchFamily="66" charset="0"/>
               </a:rPr>
-              <a:t>Attributes</a:t>
+              <a:t>Attributes (I)</a:t>
             </a:r>
             <a:endParaRPr lang="ru-RU" sz="4000" b="1" dirty="0">
               <a:solidFill>
@@ -6850,6 +6442,791 @@
         </p:nvSpPr>
         <p:spPr bwMode="auto">
           <a:xfrm>
+            <a:off x="6424969" y="721048"/>
+            <a:ext cx="5655584" cy="5602410"/>
+          </a:xfrm>
+          <a:prstGeom prst="rect">
+            <a:avLst/>
+          </a:prstGeom>
+          <a:solidFill>
+            <a:schemeClr val="tx2">
+              <a:lumMod val="40000"/>
+              <a:lumOff val="60000"/>
+            </a:schemeClr>
+          </a:solidFill>
+          <a:ln>
+            <a:noFill/>
+          </a:ln>
+          <a:effectLst/>
+          <a:extLst/>
+        </p:spPr>
+        <p:txBody>
+          <a:bodyPr lIns="0" tIns="0" rIns="0" bIns="0" anchor="ctr"/>
+          <a:lstStyle>
+            <a:lvl1pPr eaLnBrk="0" hangingPunct="0">
+              <a:defRPr sz="2400">
+                <a:solidFill>
+                  <a:schemeClr val="tx1"/>
+                </a:solidFill>
+                <a:latin typeface="Times New Roman" charset="0"/>
+              </a:defRPr>
+            </a:lvl1pPr>
+            <a:lvl2pPr marL="742950" indent="-285750" eaLnBrk="0" hangingPunct="0">
+              <a:defRPr sz="2400">
+                <a:solidFill>
+                  <a:schemeClr val="tx1"/>
+                </a:solidFill>
+                <a:latin typeface="Times New Roman" charset="0"/>
+              </a:defRPr>
+            </a:lvl2pPr>
+            <a:lvl3pPr marL="1143000" indent="-228600" eaLnBrk="0" hangingPunct="0">
+              <a:defRPr sz="2400">
+                <a:solidFill>
+                  <a:schemeClr val="tx1"/>
+                </a:solidFill>
+                <a:latin typeface="Times New Roman" charset="0"/>
+              </a:defRPr>
+            </a:lvl3pPr>
+            <a:lvl4pPr marL="1600200" indent="-228600" eaLnBrk="0" hangingPunct="0">
+              <a:defRPr sz="2400">
+                <a:solidFill>
+                  <a:schemeClr val="tx1"/>
+                </a:solidFill>
+                <a:latin typeface="Times New Roman" charset="0"/>
+              </a:defRPr>
+            </a:lvl4pPr>
+            <a:lvl5pPr marL="2057400" indent="-228600" eaLnBrk="0" hangingPunct="0">
+              <a:defRPr sz="2400">
+                <a:solidFill>
+                  <a:schemeClr val="tx1"/>
+                </a:solidFill>
+                <a:latin typeface="Times New Roman" charset="0"/>
+              </a:defRPr>
+            </a:lvl5pPr>
+            <a:lvl6pPr marL="2514600" indent="-228600" eaLnBrk="0" fontAlgn="base" hangingPunct="0">
+              <a:spcBef>
+                <a:spcPct val="0"/>
+              </a:spcBef>
+              <a:spcAft>
+                <a:spcPct val="0"/>
+              </a:spcAft>
+              <a:defRPr sz="2400">
+                <a:solidFill>
+                  <a:schemeClr val="tx1"/>
+                </a:solidFill>
+                <a:latin typeface="Times New Roman" charset="0"/>
+              </a:defRPr>
+            </a:lvl6pPr>
+            <a:lvl7pPr marL="2971800" indent="-228600" eaLnBrk="0" fontAlgn="base" hangingPunct="0">
+              <a:spcBef>
+                <a:spcPct val="0"/>
+              </a:spcBef>
+              <a:spcAft>
+                <a:spcPct val="0"/>
+              </a:spcAft>
+              <a:defRPr sz="2400">
+                <a:solidFill>
+                  <a:schemeClr val="tx1"/>
+                </a:solidFill>
+                <a:latin typeface="Times New Roman" charset="0"/>
+              </a:defRPr>
+            </a:lvl7pPr>
+            <a:lvl8pPr marL="3429000" indent="-228600" eaLnBrk="0" fontAlgn="base" hangingPunct="0">
+              <a:spcBef>
+                <a:spcPct val="0"/>
+              </a:spcBef>
+              <a:spcAft>
+                <a:spcPct val="0"/>
+              </a:spcAft>
+              <a:defRPr sz="2400">
+                <a:solidFill>
+                  <a:schemeClr val="tx1"/>
+                </a:solidFill>
+                <a:latin typeface="Times New Roman" charset="0"/>
+              </a:defRPr>
+            </a:lvl8pPr>
+            <a:lvl9pPr marL="3886200" indent="-228600" eaLnBrk="0" fontAlgn="base" hangingPunct="0">
+              <a:spcBef>
+                <a:spcPct val="0"/>
+              </a:spcBef>
+              <a:spcAft>
+                <a:spcPct val="0"/>
+              </a:spcAft>
+              <a:defRPr sz="2400">
+                <a:solidFill>
+                  <a:schemeClr val="tx1"/>
+                </a:solidFill>
+                <a:latin typeface="Times New Roman" charset="0"/>
+              </a:defRPr>
+            </a:lvl9pPr>
+          </a:lstStyle>
+          <a:p>
+            <a:r>
+              <a:rPr lang="en-US" sz="1800" dirty="0" smtClean="0">
+                <a:solidFill>
+                  <a:srgbClr val="0000FF"/>
+                </a:solidFill>
+                <a:latin typeface="Lucida Console" panose="020B0609040504020204" pitchFamily="49" charset="0"/>
+              </a:rPr>
+              <a:t>attr1</a:t>
+            </a:r>
+            <a:r>
+              <a:rPr lang="en-US" sz="1800" dirty="0">
+                <a:solidFill>
+                  <a:srgbClr val="0000FF"/>
+                </a:solidFill>
+                <a:latin typeface="Lucida Console" panose="020B0609040504020204" pitchFamily="49" charset="0"/>
+              </a:rPr>
+              <a:t>: </a:t>
+            </a:r>
+            <a:r>
+              <a:rPr lang="en-US" sz="1800" b="1" dirty="0">
+                <a:solidFill>
+                  <a:srgbClr val="0000FF"/>
+                </a:solidFill>
+                <a:latin typeface="Lucida Console" panose="020B0609040504020204" pitchFamily="49" charset="0"/>
+              </a:rPr>
+              <a:t>ref</a:t>
+            </a:r>
+            <a:r>
+              <a:rPr lang="en-US" sz="1800" dirty="0">
+                <a:solidFill>
+                  <a:srgbClr val="0000FF"/>
+                </a:solidFill>
+                <a:latin typeface="Lucida Console" panose="020B0609040504020204" pitchFamily="49" charset="0"/>
+              </a:rPr>
+              <a:t> Type /* attr1 is the reference kind attribute of type </a:t>
+            </a:r>
+            <a:r>
+              <a:rPr lang="en-US" sz="1800" dirty="0" err="1">
+                <a:solidFill>
+                  <a:srgbClr val="0000FF"/>
+                </a:solidFill>
+                <a:latin typeface="Lucida Console" panose="020B0609040504020204" pitchFamily="49" charset="0"/>
+              </a:rPr>
+              <a:t>Type</a:t>
+            </a:r>
+            <a:r>
+              <a:rPr lang="en-US" sz="1800" dirty="0">
+                <a:solidFill>
+                  <a:srgbClr val="0000FF"/>
+                </a:solidFill>
+                <a:latin typeface="Lucida Console" panose="020B0609040504020204" pitchFamily="49" charset="0"/>
+              </a:rPr>
+              <a:t> always attached to an object</a:t>
+            </a:r>
+            <a:r>
+              <a:rPr lang="en-US" sz="1800" dirty="0" smtClean="0">
+                <a:solidFill>
+                  <a:srgbClr val="0000FF"/>
+                </a:solidFill>
+                <a:latin typeface="Lucida Console" panose="020B0609040504020204" pitchFamily="49" charset="0"/>
+              </a:rPr>
+              <a:t>*/</a:t>
+            </a:r>
+          </a:p>
+          <a:p>
+            <a:endParaRPr lang="en-US" sz="1800" dirty="0">
+              <a:solidFill>
+                <a:srgbClr val="0000FF"/>
+              </a:solidFill>
+              <a:latin typeface="Lucida Console" panose="020B0609040504020204" pitchFamily="49" charset="0"/>
+            </a:endParaRPr>
+          </a:p>
+          <a:p>
+            <a:r>
+              <a:rPr lang="en-US" sz="1800" dirty="0">
+                <a:solidFill>
+                  <a:srgbClr val="0000FF"/>
+                </a:solidFill>
+                <a:latin typeface="Lucida Console" panose="020B0609040504020204" pitchFamily="49" charset="0"/>
+              </a:rPr>
+              <a:t>attr2: </a:t>
+            </a:r>
+            <a:r>
+              <a:rPr lang="en-US" sz="1800" b="1" dirty="0" err="1">
+                <a:solidFill>
+                  <a:srgbClr val="0000FF"/>
+                </a:solidFill>
+                <a:latin typeface="Lucida Console" panose="020B0609040504020204" pitchFamily="49" charset="0"/>
+              </a:rPr>
+              <a:t>val</a:t>
+            </a:r>
+            <a:r>
+              <a:rPr lang="en-US" sz="1800" dirty="0">
+                <a:solidFill>
+                  <a:srgbClr val="0000FF"/>
+                </a:solidFill>
+                <a:latin typeface="Lucida Console" panose="020B0609040504020204" pitchFamily="49" charset="0"/>
+              </a:rPr>
+              <a:t> Type /* attr2 is the value kind attribute of type </a:t>
+            </a:r>
+            <a:r>
+              <a:rPr lang="en-US" sz="1800" dirty="0" err="1">
+                <a:solidFill>
+                  <a:srgbClr val="0000FF"/>
+                </a:solidFill>
+                <a:latin typeface="Lucida Console" panose="020B0609040504020204" pitchFamily="49" charset="0"/>
+              </a:rPr>
+              <a:t>Type</a:t>
+            </a:r>
+            <a:r>
+              <a:rPr lang="en-US" sz="1800" dirty="0">
+                <a:solidFill>
+                  <a:srgbClr val="0000FF"/>
+                </a:solidFill>
+                <a:latin typeface="Lucida Console" panose="020B0609040504020204" pitchFamily="49" charset="0"/>
+              </a:rPr>
+              <a:t> always attached to an object</a:t>
+            </a:r>
+            <a:r>
+              <a:rPr lang="en-US" sz="1800" dirty="0" smtClean="0">
+                <a:solidFill>
+                  <a:srgbClr val="0000FF"/>
+                </a:solidFill>
+                <a:latin typeface="Lucida Console" panose="020B0609040504020204" pitchFamily="49" charset="0"/>
+              </a:rPr>
+              <a:t>*/</a:t>
+            </a:r>
+          </a:p>
+          <a:p>
+            <a:endParaRPr lang="en-US" sz="1800" dirty="0">
+              <a:solidFill>
+                <a:srgbClr val="0000FF"/>
+              </a:solidFill>
+              <a:latin typeface="Lucida Console" panose="020B0609040504020204" pitchFamily="49" charset="0"/>
+            </a:endParaRPr>
+          </a:p>
+          <a:p>
+            <a:r>
+              <a:rPr lang="en-US" sz="1800" dirty="0">
+                <a:solidFill>
+                  <a:srgbClr val="0000FF"/>
+                </a:solidFill>
+                <a:latin typeface="Lucida Console" panose="020B0609040504020204" pitchFamily="49" charset="0"/>
+              </a:rPr>
+              <a:t>attr3: </a:t>
+            </a:r>
+            <a:r>
+              <a:rPr lang="en-US" sz="1800" b="1" dirty="0">
+                <a:solidFill>
+                  <a:srgbClr val="0000FF"/>
+                </a:solidFill>
+                <a:latin typeface="Lucida Console" panose="020B0609040504020204" pitchFamily="49" charset="0"/>
+              </a:rPr>
+              <a:t>ref ?</a:t>
+            </a:r>
+            <a:r>
+              <a:rPr lang="en-US" sz="1800" dirty="0">
+                <a:solidFill>
+                  <a:srgbClr val="0000FF"/>
+                </a:solidFill>
+                <a:latin typeface="Lucida Console" panose="020B0609040504020204" pitchFamily="49" charset="0"/>
+              </a:rPr>
+              <a:t>Type /* attr3 is the reference kind attribute of type </a:t>
+            </a:r>
+            <a:r>
+              <a:rPr lang="en-US" sz="1800" dirty="0" err="1">
+                <a:solidFill>
+                  <a:srgbClr val="0000FF"/>
+                </a:solidFill>
+                <a:latin typeface="Lucida Console" panose="020B0609040504020204" pitchFamily="49" charset="0"/>
+              </a:rPr>
+              <a:t>Type</a:t>
+            </a:r>
+            <a:r>
+              <a:rPr lang="en-US" sz="1800" dirty="0">
+                <a:solidFill>
+                  <a:srgbClr val="0000FF"/>
+                </a:solidFill>
+                <a:latin typeface="Lucida Console" panose="020B0609040504020204" pitchFamily="49" charset="0"/>
+              </a:rPr>
+              <a:t> which may be detached </a:t>
+            </a:r>
+            <a:r>
+              <a:rPr lang="en-US" sz="1800" dirty="0" smtClean="0">
+                <a:solidFill>
+                  <a:srgbClr val="0000FF"/>
+                </a:solidFill>
+                <a:latin typeface="Lucida Console" panose="020B0609040504020204" pitchFamily="49" charset="0"/>
+              </a:rPr>
+              <a:t>*/</a:t>
+            </a:r>
+          </a:p>
+          <a:p>
+            <a:endParaRPr lang="en-US" sz="1800" dirty="0">
+              <a:solidFill>
+                <a:srgbClr val="0000FF"/>
+              </a:solidFill>
+              <a:latin typeface="Lucida Console" panose="020B0609040504020204" pitchFamily="49" charset="0"/>
+            </a:endParaRPr>
+          </a:p>
+          <a:p>
+            <a:r>
+              <a:rPr lang="en-US" sz="1800" dirty="0">
+                <a:solidFill>
+                  <a:srgbClr val="0000FF"/>
+                </a:solidFill>
+                <a:latin typeface="Lucida Console" panose="020B0609040504020204" pitchFamily="49" charset="0"/>
+              </a:rPr>
+              <a:t>attr4: </a:t>
+            </a:r>
+            <a:r>
+              <a:rPr lang="en-US" sz="1800" b="1" dirty="0" err="1">
+                <a:solidFill>
+                  <a:srgbClr val="0000FF"/>
+                </a:solidFill>
+                <a:latin typeface="Lucida Console" panose="020B0609040504020204" pitchFamily="49" charset="0"/>
+              </a:rPr>
+              <a:t>val</a:t>
+            </a:r>
+            <a:r>
+              <a:rPr lang="en-US" sz="1800" b="1" dirty="0">
+                <a:solidFill>
+                  <a:srgbClr val="0000FF"/>
+                </a:solidFill>
+                <a:latin typeface="Lucida Console" panose="020B0609040504020204" pitchFamily="49" charset="0"/>
+              </a:rPr>
+              <a:t> ?</a:t>
+            </a:r>
+            <a:r>
+              <a:rPr lang="en-US" sz="1800" dirty="0">
+                <a:solidFill>
+                  <a:srgbClr val="0000FF"/>
+                </a:solidFill>
+                <a:latin typeface="Lucida Console" panose="020B0609040504020204" pitchFamily="49" charset="0"/>
+              </a:rPr>
+              <a:t>Type /* attr4 is the value kind attribute of type </a:t>
+            </a:r>
+            <a:r>
+              <a:rPr lang="en-US" sz="1800" dirty="0" err="1">
+                <a:solidFill>
+                  <a:srgbClr val="0000FF"/>
+                </a:solidFill>
+                <a:latin typeface="Lucida Console" panose="020B0609040504020204" pitchFamily="49" charset="0"/>
+              </a:rPr>
+              <a:t>Type</a:t>
+            </a:r>
+            <a:r>
+              <a:rPr lang="en-US" sz="1800" dirty="0">
+                <a:solidFill>
+                  <a:srgbClr val="0000FF"/>
+                </a:solidFill>
+                <a:latin typeface="Lucida Console" panose="020B0609040504020204" pitchFamily="49" charset="0"/>
+              </a:rPr>
+              <a:t> which may be detached </a:t>
+            </a:r>
+            <a:r>
+              <a:rPr lang="en-US" sz="1800" dirty="0" smtClean="0">
+                <a:solidFill>
+                  <a:srgbClr val="0000FF"/>
+                </a:solidFill>
+                <a:latin typeface="Lucida Console" panose="020B0609040504020204" pitchFamily="49" charset="0"/>
+              </a:rPr>
+              <a:t>*/</a:t>
+            </a:r>
+            <a:endParaRPr lang="de-DE" sz="1800" dirty="0">
+              <a:solidFill>
+                <a:srgbClr val="0000FF"/>
+              </a:solidFill>
+              <a:latin typeface="Lucida Console" panose="020B0609040504020204" pitchFamily="49" charset="0"/>
+            </a:endParaRPr>
+          </a:p>
+        </p:txBody>
+      </p:sp>
+      <p:sp>
+        <p:nvSpPr>
+          <p:cNvPr id="5" name="Подзаголовок 2"/>
+          <p:cNvSpPr txBox="1">
+            <a:spLocks noChangeAspect="1"/>
+          </p:cNvSpPr>
+          <p:nvPr/>
+        </p:nvSpPr>
+        <p:spPr bwMode="auto">
+          <a:xfrm>
+            <a:off x="86070" y="553356"/>
+            <a:ext cx="6277491" cy="5940088"/>
+          </a:xfrm>
+          <a:prstGeom prst="rect">
+            <a:avLst/>
+          </a:prstGeom>
+          <a:noFill/>
+          <a:ln>
+            <a:noFill/>
+          </a:ln>
+          <a:extLst>
+            <a:ext uri="{909E8E84-426E-40DD-AFC4-6F175D3DCCD1}">
+              <a14:hiddenFill xmlns:a14="http://schemas.microsoft.com/office/drawing/2010/main">
+                <a:solidFill>
+                  <a:srgbClr val="FFFFFF"/>
+                </a:solidFill>
+              </a14:hiddenFill>
+            </a:ext>
+            <a:ext uri="{91240B29-F687-4F45-9708-019B960494DF}">
+              <a14:hiddenLine xmlns:a14="http://schemas.microsoft.com/office/drawing/2010/main" w="9525">
+                <a:solidFill>
+                  <a:srgbClr val="000000"/>
+                </a:solidFill>
+                <a:miter lim="800000"/>
+                <a:headEnd/>
+                <a:tailEnd/>
+              </a14:hiddenLine>
+            </a:ext>
+          </a:extLst>
+        </p:spPr>
+        <p:txBody>
+          <a:bodyPr lIns="0" rIns="0">
+            <a:spAutoFit/>
+          </a:bodyPr>
+          <a:lstStyle>
+            <a:lvl1pPr eaLnBrk="0" hangingPunct="0">
+              <a:spcBef>
+                <a:spcPct val="20000"/>
+              </a:spcBef>
+              <a:buChar char="•"/>
+              <a:defRPr sz="3200">
+                <a:solidFill>
+                  <a:schemeClr val="tx1"/>
+                </a:solidFill>
+                <a:latin typeface="Times New Roman" charset="0"/>
+              </a:defRPr>
+            </a:lvl1pPr>
+            <a:lvl2pPr marL="742950" indent="-285750" eaLnBrk="0" hangingPunct="0">
+              <a:spcBef>
+                <a:spcPct val="20000"/>
+              </a:spcBef>
+              <a:buChar char="–"/>
+              <a:defRPr sz="2800">
+                <a:solidFill>
+                  <a:schemeClr val="tx1"/>
+                </a:solidFill>
+                <a:latin typeface="Times New Roman" charset="0"/>
+              </a:defRPr>
+            </a:lvl2pPr>
+            <a:lvl3pPr marL="1143000" indent="-228600" eaLnBrk="0" hangingPunct="0">
+              <a:spcBef>
+                <a:spcPct val="20000"/>
+              </a:spcBef>
+              <a:buChar char="•"/>
+              <a:defRPr sz="2400">
+                <a:solidFill>
+                  <a:schemeClr val="tx1"/>
+                </a:solidFill>
+                <a:latin typeface="Times New Roman" charset="0"/>
+              </a:defRPr>
+            </a:lvl3pPr>
+            <a:lvl4pPr marL="1600200" indent="-228600" eaLnBrk="0" hangingPunct="0">
+              <a:spcBef>
+                <a:spcPct val="20000"/>
+              </a:spcBef>
+              <a:buChar char="–"/>
+              <a:defRPr sz="2000">
+                <a:solidFill>
+                  <a:schemeClr val="tx1"/>
+                </a:solidFill>
+                <a:latin typeface="Times New Roman" charset="0"/>
+              </a:defRPr>
+            </a:lvl4pPr>
+            <a:lvl5pPr marL="2057400" indent="-228600" eaLnBrk="0" hangingPunct="0">
+              <a:spcBef>
+                <a:spcPct val="20000"/>
+              </a:spcBef>
+              <a:buChar char="»"/>
+              <a:defRPr sz="2000">
+                <a:solidFill>
+                  <a:schemeClr val="tx1"/>
+                </a:solidFill>
+                <a:latin typeface="Times New Roman" charset="0"/>
+              </a:defRPr>
+            </a:lvl5pPr>
+            <a:lvl6pPr marL="2514600" indent="-228600" eaLnBrk="0" fontAlgn="base" hangingPunct="0">
+              <a:spcBef>
+                <a:spcPct val="20000"/>
+              </a:spcBef>
+              <a:spcAft>
+                <a:spcPct val="0"/>
+              </a:spcAft>
+              <a:buChar char="»"/>
+              <a:defRPr sz="2000">
+                <a:solidFill>
+                  <a:schemeClr val="tx1"/>
+                </a:solidFill>
+                <a:latin typeface="Times New Roman" charset="0"/>
+              </a:defRPr>
+            </a:lvl6pPr>
+            <a:lvl7pPr marL="2971800" indent="-228600" eaLnBrk="0" fontAlgn="base" hangingPunct="0">
+              <a:spcBef>
+                <a:spcPct val="20000"/>
+              </a:spcBef>
+              <a:spcAft>
+                <a:spcPct val="0"/>
+              </a:spcAft>
+              <a:buChar char="»"/>
+              <a:defRPr sz="2000">
+                <a:solidFill>
+                  <a:schemeClr val="tx1"/>
+                </a:solidFill>
+                <a:latin typeface="Times New Roman" charset="0"/>
+              </a:defRPr>
+            </a:lvl7pPr>
+            <a:lvl8pPr marL="3429000" indent="-228600" eaLnBrk="0" fontAlgn="base" hangingPunct="0">
+              <a:spcBef>
+                <a:spcPct val="20000"/>
+              </a:spcBef>
+              <a:spcAft>
+                <a:spcPct val="0"/>
+              </a:spcAft>
+              <a:buChar char="»"/>
+              <a:defRPr sz="2000">
+                <a:solidFill>
+                  <a:schemeClr val="tx1"/>
+                </a:solidFill>
+                <a:latin typeface="Times New Roman" charset="0"/>
+              </a:defRPr>
+            </a:lvl8pPr>
+            <a:lvl9pPr marL="3886200" indent="-228600" eaLnBrk="0" fontAlgn="base" hangingPunct="0">
+              <a:spcBef>
+                <a:spcPct val="20000"/>
+              </a:spcBef>
+              <a:spcAft>
+                <a:spcPct val="0"/>
+              </a:spcAft>
+              <a:buChar char="»"/>
+              <a:defRPr sz="2000">
+                <a:solidFill>
+                  <a:schemeClr val="tx1"/>
+                </a:solidFill>
+                <a:latin typeface="Times New Roman" charset="0"/>
+              </a:defRPr>
+            </a:lvl9pPr>
+          </a:lstStyle>
+          <a:p>
+            <a:pPr marL="457200" indent="-457200" eaLnBrk="1" hangingPunct="1"/>
+            <a:r>
+              <a:rPr lang="en-US" altLang="ru-RU" sz="2800" dirty="0" smtClean="0">
+                <a:latin typeface="Times New Roman" panose="02020603050405020304" pitchFamily="18" charset="0"/>
+                <a:cs typeface="Times New Roman" panose="02020603050405020304" pitchFamily="18" charset="0"/>
+              </a:rPr>
+              <a:t>Attribute </a:t>
+            </a:r>
+            <a:r>
+              <a:rPr lang="en-US" altLang="ru-RU" sz="2800" dirty="0" smtClean="0">
+                <a:latin typeface="Times New Roman" panose="02020603050405020304" pitchFamily="18" charset="0"/>
+                <a:cs typeface="Times New Roman" panose="02020603050405020304" pitchFamily="18" charset="0"/>
+              </a:rPr>
+              <a:t>may be of reference or value kind</a:t>
+            </a:r>
+          </a:p>
+          <a:p>
+            <a:pPr marL="457200" indent="-457200" eaLnBrk="1" hangingPunct="1"/>
+            <a:r>
+              <a:rPr lang="en-US" altLang="ru-RU" sz="2800" dirty="0" smtClean="0">
+                <a:latin typeface="Times New Roman" panose="02020603050405020304" pitchFamily="18" charset="0"/>
+                <a:cs typeface="Times New Roman" panose="02020603050405020304" pitchFamily="18" charset="0"/>
+              </a:rPr>
+              <a:t>Attribute can be variable (mutable) or constant (immutable) (shallow or deep)</a:t>
+            </a:r>
+          </a:p>
+          <a:p>
+            <a:pPr marL="457200" indent="-457200" eaLnBrk="1" hangingPunct="1"/>
+            <a:r>
+              <a:rPr lang="en-US" altLang="ru-RU" sz="2800" dirty="0" smtClean="0">
+                <a:latin typeface="Times New Roman" panose="02020603050405020304" pitchFamily="18" charset="0"/>
+                <a:cs typeface="Times New Roman" panose="02020603050405020304" pitchFamily="18" charset="0"/>
+              </a:rPr>
+              <a:t>Attribute can be always attached to an object or can be detachable. </a:t>
+            </a:r>
+          </a:p>
+          <a:p>
+            <a:pPr marL="457200" indent="-457200" eaLnBrk="1" hangingPunct="1"/>
+            <a:r>
+              <a:rPr lang="en-US" altLang="ru-RU" sz="2800" dirty="0" smtClean="0">
+                <a:latin typeface="Times New Roman" panose="02020603050405020304" pitchFamily="18" charset="0"/>
+                <a:cs typeface="Times New Roman" panose="02020603050405020304" pitchFamily="18" charset="0"/>
+              </a:rPr>
+              <a:t>Which </a:t>
+            </a:r>
+            <a:r>
+              <a:rPr lang="en-US" altLang="ru-RU" sz="2800" dirty="0" smtClean="0">
+                <a:latin typeface="Times New Roman" panose="02020603050405020304" pitchFamily="18" charset="0"/>
+                <a:cs typeface="Times New Roman" panose="02020603050405020304" pitchFamily="18" charset="0"/>
+              </a:rPr>
+              <a:t>operations can be applied to  </a:t>
+            </a:r>
+            <a:r>
+              <a:rPr lang="en-US" altLang="ru-RU" sz="2800" dirty="0" smtClean="0">
+                <a:latin typeface="Times New Roman" panose="02020603050405020304" pitchFamily="18" charset="0"/>
+                <a:cs typeface="Times New Roman" panose="02020603050405020304" pitchFamily="18" charset="0"/>
+              </a:rPr>
+              <a:t>attribute</a:t>
+            </a:r>
+            <a:r>
+              <a:rPr lang="en-US" altLang="ru-RU" sz="2800" dirty="0" smtClean="0">
+                <a:latin typeface="Times New Roman" panose="02020603050405020304" pitchFamily="18" charset="0"/>
+                <a:cs typeface="Times New Roman" panose="02020603050405020304" pitchFamily="18" charset="0"/>
+              </a:rPr>
+              <a:t>s</a:t>
+            </a:r>
+            <a:r>
+              <a:rPr lang="en-US" altLang="ru-RU" sz="2800" dirty="0" smtClean="0">
+                <a:latin typeface="Times New Roman" panose="02020603050405020304" pitchFamily="18" charset="0"/>
+                <a:cs typeface="Times New Roman" panose="02020603050405020304" pitchFamily="18" charset="0"/>
+              </a:rPr>
+              <a:t>?</a:t>
+            </a:r>
+          </a:p>
+          <a:p>
+            <a:pPr marL="1200150" lvl="1" indent="-457200" eaLnBrk="1" hangingPunct="1"/>
+            <a:r>
+              <a:rPr lang="en-US" altLang="ru-RU" sz="2400" dirty="0" smtClean="0">
+                <a:latin typeface="Times New Roman" panose="02020603050405020304" pitchFamily="18" charset="0"/>
+                <a:cs typeface="Times New Roman" panose="02020603050405020304" pitchFamily="18" charset="0"/>
+              </a:rPr>
+              <a:t>Attach to an object</a:t>
+            </a:r>
+          </a:p>
+          <a:p>
+            <a:pPr marL="1200150" lvl="1" indent="-457200" eaLnBrk="1" hangingPunct="1"/>
+            <a:r>
+              <a:rPr lang="en-US" altLang="ru-RU" sz="2400" dirty="0" smtClean="0">
+                <a:latin typeface="Times New Roman" panose="02020603050405020304" pitchFamily="18" charset="0"/>
+                <a:cs typeface="Times New Roman" panose="02020603050405020304" pitchFamily="18" charset="0"/>
+              </a:rPr>
+              <a:t>Detach </a:t>
+            </a:r>
+            <a:r>
+              <a:rPr lang="en-US" altLang="ru-RU" sz="2400" dirty="0" smtClean="0">
+                <a:latin typeface="Times New Roman" panose="02020603050405020304" pitchFamily="18" charset="0"/>
+                <a:cs typeface="Times New Roman" panose="02020603050405020304" pitchFamily="18" charset="0"/>
+              </a:rPr>
+              <a:t>from an object</a:t>
+            </a:r>
+            <a:endParaRPr lang="en-US" altLang="ru-RU" sz="2400" dirty="0" smtClean="0">
+              <a:latin typeface="Times New Roman" panose="02020603050405020304" pitchFamily="18" charset="0"/>
+              <a:cs typeface="Times New Roman" panose="02020603050405020304" pitchFamily="18" charset="0"/>
+            </a:endParaRPr>
+          </a:p>
+          <a:p>
+            <a:pPr marL="1200150" lvl="1" indent="-457200" eaLnBrk="1" hangingPunct="1"/>
+            <a:r>
+              <a:rPr lang="en-US" altLang="ru-RU" sz="2400" dirty="0" smtClean="0">
+                <a:latin typeface="Times New Roman" panose="02020603050405020304" pitchFamily="18" charset="0"/>
+                <a:cs typeface="Times New Roman" panose="02020603050405020304" pitchFamily="18" charset="0"/>
+              </a:rPr>
+              <a:t>Activate (access, invoke, call, …) one of attached object </a:t>
+            </a:r>
+            <a:r>
+              <a:rPr lang="en-US" altLang="ru-RU" sz="2400" dirty="0" smtClean="0">
+                <a:latin typeface="Times New Roman" panose="02020603050405020304" pitchFamily="18" charset="0"/>
+                <a:cs typeface="Times New Roman" panose="02020603050405020304" pitchFamily="18" charset="0"/>
+              </a:rPr>
+              <a:t>attributes</a:t>
+            </a:r>
+          </a:p>
+          <a:p>
+            <a:pPr marL="1200150" lvl="1" indent="-457200" eaLnBrk="1" hangingPunct="1"/>
+            <a:r>
+              <a:rPr lang="en-US" altLang="ru-RU" sz="2400" dirty="0" smtClean="0">
+                <a:latin typeface="Times New Roman" panose="02020603050405020304" pitchFamily="18" charset="0"/>
+                <a:cs typeface="Times New Roman" panose="02020603050405020304" pitchFamily="18" charset="0"/>
+              </a:rPr>
+              <a:t>Check if attribute is attached to an object</a:t>
+            </a:r>
+            <a:endParaRPr lang="en-US" altLang="ru-RU" sz="2400" dirty="0" smtClean="0">
+              <a:latin typeface="Times New Roman" panose="02020603050405020304" pitchFamily="18" charset="0"/>
+              <a:cs typeface="Times New Roman" panose="02020603050405020304" pitchFamily="18" charset="0"/>
+            </a:endParaRPr>
+          </a:p>
+        </p:txBody>
+      </p:sp>
+      <p:sp>
+        <p:nvSpPr>
+          <p:cNvPr id="8" name="TextBox 7"/>
+          <p:cNvSpPr txBox="1"/>
+          <p:nvPr/>
+        </p:nvSpPr>
+        <p:spPr>
+          <a:xfrm>
+            <a:off x="1943364" y="-25628"/>
+            <a:ext cx="8441012" cy="707886"/>
+          </a:xfrm>
+          <a:prstGeom prst="rect">
+            <a:avLst/>
+          </a:prstGeom>
+          <a:noFill/>
+        </p:spPr>
+        <p:txBody>
+          <a:bodyPr wrap="square" rtlCol="0">
+            <a:spAutoFit/>
+          </a:bodyPr>
+          <a:lstStyle/>
+          <a:p>
+            <a:pPr algn="ctr"/>
+            <a:r>
+              <a:rPr lang="en-US" sz="4000" b="1" dirty="0" smtClean="0">
+                <a:solidFill>
+                  <a:srgbClr val="CC6600"/>
+                </a:solidFill>
+                <a:latin typeface="Comic Sans MS" panose="030F0702030302020204" pitchFamily="66" charset="0"/>
+              </a:rPr>
+              <a:t>Attributes (II)</a:t>
+            </a:r>
+            <a:endParaRPr lang="ru-RU" sz="4000" b="1" dirty="0">
+              <a:solidFill>
+                <a:srgbClr val="CC6600"/>
+              </a:solidFill>
+              <a:latin typeface="Comic Sans MS" panose="030F0702030302020204" pitchFamily="66" charset="0"/>
+            </a:endParaRPr>
+          </a:p>
+        </p:txBody>
+      </p:sp>
+    </p:spTree>
+    <p:extLst>
+      <p:ext uri="{BB962C8B-B14F-4D97-AF65-F5344CB8AC3E}">
+        <p14:creationId xmlns:p14="http://schemas.microsoft.com/office/powerpoint/2010/main" val="3621388766"/>
+      </p:ext>
+    </p:extLst>
+  </p:cSld>
+  <p:clrMapOvr>
+    <a:masterClrMapping/>
+  </p:clrMapOvr>
+  <p:timing>
+    <p:tnLst>
+      <p:par>
+        <p:cTn id="1" dur="indefinite" restart="never" nodeType="tmRoot"/>
+      </p:par>
+    </p:tnLst>
+  </p:timing>
+</p:sld>
+</file>
+
+<file path=ppt/slides/slide6.xml><?xml version="1.0" encoding="utf-8"?>
+<p:sld xmlns:a="http://schemas.openxmlformats.org/drawingml/2006/main" xmlns:r="http://schemas.openxmlformats.org/officeDocument/2006/relationships" xmlns:p="http://schemas.openxmlformats.org/presentationml/2006/main">
+  <p:cSld>
+    <p:spTree>
+      <p:nvGrpSpPr>
+        <p:cNvPr id="1" name=""/>
+        <p:cNvGrpSpPr/>
+        <p:nvPr/>
+      </p:nvGrpSpPr>
+      <p:grpSpPr>
+        <a:xfrm>
+          <a:off x="0" y="0"/>
+          <a:ext cx="0" cy="0"/>
+          <a:chOff x="0" y="0"/>
+          <a:chExt cx="0" cy="0"/>
+        </a:xfrm>
+      </p:grpSpPr>
+      <p:sp>
+        <p:nvSpPr>
+          <p:cNvPr id="3" name="Text Box 7"/>
+          <p:cNvSpPr txBox="1">
+            <a:spLocks noChangeArrowheads="1"/>
+          </p:cNvSpPr>
+          <p:nvPr/>
+        </p:nvSpPr>
+        <p:spPr bwMode="auto">
+          <a:xfrm>
             <a:off x="6580746" y="1135164"/>
             <a:ext cx="5238314" cy="5188293"/>
           </a:xfrm>
@@ -7353,7 +7730,7 @@
         <p:spPr bwMode="auto">
           <a:xfrm>
             <a:off x="86070" y="682258"/>
-            <a:ext cx="6277491" cy="8783943"/>
+            <a:ext cx="6277491" cy="5693866"/>
           </a:xfrm>
           <a:prstGeom prst="rect">
             <a:avLst/>
@@ -7549,7 +7926,50 @@
                 <a:latin typeface="Times New Roman" panose="02020603050405020304" pitchFamily="18" charset="0"/>
                 <a:cs typeface="Times New Roman" panose="02020603050405020304" pitchFamily="18" charset="0"/>
               </a:rPr>
-              <a:t>May have a name</a:t>
+              <a:t>May have a </a:t>
+            </a:r>
+            <a:r>
+              <a:rPr lang="en-US" altLang="ru-RU" sz="2400" dirty="0" smtClean="0">
+                <a:latin typeface="Times New Roman" panose="02020603050405020304" pitchFamily="18" charset="0"/>
+                <a:cs typeface="Times New Roman" panose="02020603050405020304" pitchFamily="18" charset="0"/>
+              </a:rPr>
+              <a:t>name</a:t>
+            </a:r>
+          </a:p>
+          <a:p>
+            <a:pPr lvl="1" indent="0" eaLnBrk="1" hangingPunct="1">
+              <a:buNone/>
+            </a:pPr>
+            <a:r>
+              <a:rPr lang="en-US" altLang="ru-RU" sz="2400" dirty="0" smtClean="0">
+                <a:latin typeface="Times New Roman" panose="02020603050405020304" pitchFamily="18" charset="0"/>
+                <a:cs typeface="Times New Roman" panose="02020603050405020304" pitchFamily="18" charset="0"/>
+              </a:rPr>
+              <a:t>Or</a:t>
+            </a:r>
+          </a:p>
+          <a:p>
+            <a:pPr marL="1085850" lvl="1" indent="-342900" eaLnBrk="1" hangingPunct="1"/>
+            <a:r>
+              <a:rPr lang="en-US" altLang="ru-RU" sz="2400" dirty="0" smtClean="0">
+                <a:latin typeface="Times New Roman" panose="02020603050405020304" pitchFamily="18" charset="0"/>
+                <a:cs typeface="Times New Roman" panose="02020603050405020304" pitchFamily="18" charset="0"/>
+              </a:rPr>
+              <a:t>Set </a:t>
+            </a:r>
+            <a:r>
+              <a:rPr lang="en-US" altLang="ru-RU" sz="2400" dirty="0">
+                <a:latin typeface="Times New Roman" panose="02020603050405020304" pitchFamily="18" charset="0"/>
+                <a:cs typeface="Times New Roman" panose="02020603050405020304" pitchFamily="18" charset="0"/>
+              </a:rPr>
+              <a:t>of </a:t>
+            </a:r>
+            <a:r>
+              <a:rPr lang="en-US" altLang="ru-RU" sz="2400" dirty="0" smtClean="0">
+                <a:latin typeface="Times New Roman" panose="02020603050405020304" pitchFamily="18" charset="0"/>
+                <a:cs typeface="Times New Roman" panose="02020603050405020304" pitchFamily="18" charset="0"/>
+              </a:rPr>
+              <a:t>objects</a:t>
             </a:r>
             <a:endParaRPr lang="en-US" altLang="ru-RU" sz="2400" dirty="0" smtClean="0">
               <a:latin typeface="Times New Roman" panose="02020603050405020304" pitchFamily="18" charset="0"/>
@@ -7593,82 +8013,14 @@
                 <a:latin typeface="Times New Roman" panose="02020603050405020304" pitchFamily="18" charset="0"/>
                 <a:cs typeface="Times New Roman" panose="02020603050405020304" pitchFamily="18" charset="0"/>
               </a:rPr>
-              <a:t>Type may be defined as description of all objects of this type (all potential values and all operations)</a:t>
-            </a:r>
-            <a:endParaRPr lang="en-US" altLang="ru-RU" sz="2400" dirty="0" smtClean="0">
-              <a:latin typeface="Times New Roman" panose="02020603050405020304" pitchFamily="18" charset="0"/>
-              <a:cs typeface="Times New Roman" panose="02020603050405020304" pitchFamily="18" charset="0"/>
-            </a:endParaRPr>
-          </a:p>
-          <a:p>
-            <a:pPr marL="457200" indent="-457200" eaLnBrk="1" hangingPunct="1"/>
-            <a:r>
-              <a:rPr lang="en-US" altLang="ru-RU" sz="2800" dirty="0" smtClean="0">
-                <a:latin typeface="Times New Roman" panose="02020603050405020304" pitchFamily="18" charset="0"/>
-                <a:cs typeface="Times New Roman" panose="02020603050405020304" pitchFamily="18" charset="0"/>
-              </a:rPr>
-              <a:t>How many objects of the type can be created?</a:t>
-            </a:r>
-          </a:p>
-          <a:p>
-            <a:pPr marL="1200150" lvl="1" indent="-457200" eaLnBrk="1" hangingPunct="1"/>
+              <a:t>Type may be defined as description of all objects of this type (all potential values and all operations</a:t>
+            </a:r>
             <a:r>
               <a:rPr lang="en-US" altLang="ru-RU" sz="2400" dirty="0" smtClean="0">
                 <a:latin typeface="Times New Roman" panose="02020603050405020304" pitchFamily="18" charset="0"/>
                 <a:cs typeface="Times New Roman" panose="02020603050405020304" pitchFamily="18" charset="0"/>
               </a:rPr>
-              <a:t>1 (singleton) or number fixed at compile time</a:t>
-            </a:r>
-          </a:p>
-          <a:p>
-            <a:pPr marL="1200150" lvl="1" indent="-457200" eaLnBrk="1" hangingPunct="1"/>
-            <a:r>
-              <a:rPr lang="en-US" altLang="ru-RU" sz="2400" dirty="0" smtClean="0">
-                <a:latin typeface="Times New Roman" panose="02020603050405020304" pitchFamily="18" charset="0"/>
-                <a:cs typeface="Times New Roman" panose="02020603050405020304" pitchFamily="18" charset="0"/>
-              </a:rPr>
-              <a:t>Unlimited (determined by program execution)</a:t>
-            </a:r>
-          </a:p>
-          <a:p>
-            <a:pPr marL="457200" indent="-457200" eaLnBrk="1" hangingPunct="1"/>
-            <a:r>
-              <a:rPr lang="en-US" altLang="ru-RU" sz="2800" dirty="0" smtClean="0">
-                <a:latin typeface="Times New Roman" panose="02020603050405020304" pitchFamily="18" charset="0"/>
-                <a:cs typeface="Times New Roman" panose="02020603050405020304" pitchFamily="18" charset="0"/>
-              </a:rPr>
-              <a:t>Which relations can be between types</a:t>
-            </a:r>
-            <a:r>
-              <a:rPr lang="en-US" altLang="ru-RU" sz="2800" dirty="0" smtClean="0">
-                <a:latin typeface="Times New Roman" panose="02020603050405020304" pitchFamily="18" charset="0"/>
-                <a:cs typeface="Times New Roman" panose="02020603050405020304" pitchFamily="18" charset="0"/>
-              </a:rPr>
-              <a:t>?</a:t>
-            </a:r>
-            <a:endParaRPr lang="en-US" altLang="ru-RU" sz="2800" dirty="0" smtClean="0">
-              <a:latin typeface="Times New Roman" panose="02020603050405020304" pitchFamily="18" charset="0"/>
-              <a:cs typeface="Times New Roman" panose="02020603050405020304" pitchFamily="18" charset="0"/>
-            </a:endParaRPr>
-          </a:p>
-          <a:p>
-            <a:pPr marL="1200150" lvl="1" indent="-457200" eaLnBrk="1" hangingPunct="1"/>
-            <a:r>
-              <a:rPr lang="en-US" altLang="ru-RU" sz="2400" dirty="0" smtClean="0">
-                <a:latin typeface="Times New Roman" panose="02020603050405020304" pitchFamily="18" charset="0"/>
-                <a:cs typeface="Times New Roman" panose="02020603050405020304" pitchFamily="18" charset="0"/>
-              </a:rPr>
-              <a:t>Inheritance (is)</a:t>
-            </a:r>
-          </a:p>
-          <a:p>
-            <a:pPr marL="1200150" lvl="1" indent="-457200" eaLnBrk="1" hangingPunct="1"/>
-            <a:r>
-              <a:rPr lang="en-US" altLang="ru-RU" sz="2400" dirty="0" smtClean="0">
-                <a:latin typeface="Times New Roman" panose="02020603050405020304" pitchFamily="18" charset="0"/>
-                <a:cs typeface="Times New Roman" panose="02020603050405020304" pitchFamily="18" charset="0"/>
-              </a:rPr>
-              <a:t>Usage (aggregation, has)</a:t>
+              <a:t>)</a:t>
             </a:r>
             <a:endParaRPr lang="en-US" altLang="ru-RU" sz="2400" dirty="0" smtClean="0">
               <a:latin typeface="Times New Roman" panose="02020603050405020304" pitchFamily="18" charset="0"/>
@@ -7707,16 +8059,7 @@
                 </a:solidFill>
                 <a:latin typeface="Comic Sans MS" panose="030F0702030302020204" pitchFamily="66" charset="0"/>
               </a:rPr>
-              <a:t>Type</a:t>
-            </a:r>
-            <a:r>
-              <a:rPr lang="en-US" sz="4000" b="1" dirty="0" smtClean="0">
-                <a:solidFill>
-                  <a:srgbClr val="CC6600"/>
-                </a:solidFill>
-                <a:latin typeface="Comic Sans MS" panose="030F0702030302020204" pitchFamily="66" charset="0"/>
-              </a:rPr>
-              <a:t>s</a:t>
+              <a:t>Types (I)</a:t>
             </a:r>
             <a:endParaRPr lang="ru-RU" sz="4000" b="1" dirty="0">
               <a:solidFill>
@@ -7731,6 +8074,795 @@
     <p:extLst>
       <p:ext uri="{BB962C8B-B14F-4D97-AF65-F5344CB8AC3E}">
         <p14:creationId xmlns:p14="http://schemas.microsoft.com/office/powerpoint/2010/main" val="1193227599"/>
+      </p:ext>
+    </p:extLst>
+  </p:cSld>
+  <p:clrMapOvr>
+    <a:masterClrMapping/>
+  </p:clrMapOvr>
+  <p:timing>
+    <p:tnLst>
+      <p:par>
+        <p:cTn id="1" dur="indefinite" restart="never" nodeType="tmRoot"/>
+      </p:par>
+    </p:tnLst>
+  </p:timing>
+</p:sld>
+</file>
+
+<file path=ppt/slides/slide7.xml><?xml version="1.0" encoding="utf-8"?>
+<p:sld xmlns:a="http://schemas.openxmlformats.org/drawingml/2006/main" xmlns:r="http://schemas.openxmlformats.org/officeDocument/2006/relationships" xmlns:p="http://schemas.openxmlformats.org/presentationml/2006/main">
+  <p:cSld>
+    <p:spTree>
+      <p:nvGrpSpPr>
+        <p:cNvPr id="1" name=""/>
+        <p:cNvGrpSpPr/>
+        <p:nvPr/>
+      </p:nvGrpSpPr>
+      <p:grpSpPr>
+        <a:xfrm>
+          <a:off x="0" y="0"/>
+          <a:ext cx="0" cy="0"/>
+          <a:chOff x="0" y="0"/>
+          <a:chExt cx="0" cy="0"/>
+        </a:xfrm>
+      </p:grpSpPr>
+      <p:sp>
+        <p:nvSpPr>
+          <p:cNvPr id="3" name="Text Box 7"/>
+          <p:cNvSpPr txBox="1">
+            <a:spLocks noChangeArrowheads="1"/>
+          </p:cNvSpPr>
+          <p:nvPr/>
+        </p:nvSpPr>
+        <p:spPr bwMode="auto">
+          <a:xfrm>
+            <a:off x="6580746" y="1135164"/>
+            <a:ext cx="5238314" cy="5188293"/>
+          </a:xfrm>
+          <a:prstGeom prst="rect">
+            <a:avLst/>
+          </a:prstGeom>
+          <a:solidFill>
+            <a:schemeClr val="tx2">
+              <a:lumMod val="40000"/>
+              <a:lumOff val="60000"/>
+            </a:schemeClr>
+          </a:solidFill>
+          <a:ln>
+            <a:noFill/>
+          </a:ln>
+          <a:effectLst/>
+          <a:extLst/>
+        </p:spPr>
+        <p:txBody>
+          <a:bodyPr lIns="0" tIns="0" rIns="0" bIns="0" anchor="ctr"/>
+          <a:lstStyle>
+            <a:lvl1pPr eaLnBrk="0" hangingPunct="0">
+              <a:defRPr sz="2400">
+                <a:solidFill>
+                  <a:schemeClr val="tx1"/>
+                </a:solidFill>
+                <a:latin typeface="Times New Roman" charset="0"/>
+              </a:defRPr>
+            </a:lvl1pPr>
+            <a:lvl2pPr marL="742950" indent="-285750" eaLnBrk="0" hangingPunct="0">
+              <a:defRPr sz="2400">
+                <a:solidFill>
+                  <a:schemeClr val="tx1"/>
+                </a:solidFill>
+                <a:latin typeface="Times New Roman" charset="0"/>
+              </a:defRPr>
+            </a:lvl2pPr>
+            <a:lvl3pPr marL="1143000" indent="-228600" eaLnBrk="0" hangingPunct="0">
+              <a:defRPr sz="2400">
+                <a:solidFill>
+                  <a:schemeClr val="tx1"/>
+                </a:solidFill>
+                <a:latin typeface="Times New Roman" charset="0"/>
+              </a:defRPr>
+            </a:lvl3pPr>
+            <a:lvl4pPr marL="1600200" indent="-228600" eaLnBrk="0" hangingPunct="0">
+              <a:defRPr sz="2400">
+                <a:solidFill>
+                  <a:schemeClr val="tx1"/>
+                </a:solidFill>
+                <a:latin typeface="Times New Roman" charset="0"/>
+              </a:defRPr>
+            </a:lvl4pPr>
+            <a:lvl5pPr marL="2057400" indent="-228600" eaLnBrk="0" hangingPunct="0">
+              <a:defRPr sz="2400">
+                <a:solidFill>
+                  <a:schemeClr val="tx1"/>
+                </a:solidFill>
+                <a:latin typeface="Times New Roman" charset="0"/>
+              </a:defRPr>
+            </a:lvl5pPr>
+            <a:lvl6pPr marL="2514600" indent="-228600" eaLnBrk="0" fontAlgn="base" hangingPunct="0">
+              <a:spcBef>
+                <a:spcPct val="0"/>
+              </a:spcBef>
+              <a:spcAft>
+                <a:spcPct val="0"/>
+              </a:spcAft>
+              <a:defRPr sz="2400">
+                <a:solidFill>
+                  <a:schemeClr val="tx1"/>
+                </a:solidFill>
+                <a:latin typeface="Times New Roman" charset="0"/>
+              </a:defRPr>
+            </a:lvl6pPr>
+            <a:lvl7pPr marL="2971800" indent="-228600" eaLnBrk="0" fontAlgn="base" hangingPunct="0">
+              <a:spcBef>
+                <a:spcPct val="0"/>
+              </a:spcBef>
+              <a:spcAft>
+                <a:spcPct val="0"/>
+              </a:spcAft>
+              <a:defRPr sz="2400">
+                <a:solidFill>
+                  <a:schemeClr val="tx1"/>
+                </a:solidFill>
+                <a:latin typeface="Times New Roman" charset="0"/>
+              </a:defRPr>
+            </a:lvl7pPr>
+            <a:lvl8pPr marL="3429000" indent="-228600" eaLnBrk="0" fontAlgn="base" hangingPunct="0">
+              <a:spcBef>
+                <a:spcPct val="0"/>
+              </a:spcBef>
+              <a:spcAft>
+                <a:spcPct val="0"/>
+              </a:spcAft>
+              <a:defRPr sz="2400">
+                <a:solidFill>
+                  <a:schemeClr val="tx1"/>
+                </a:solidFill>
+                <a:latin typeface="Times New Roman" charset="0"/>
+              </a:defRPr>
+            </a:lvl8pPr>
+            <a:lvl9pPr marL="3886200" indent="-228600" eaLnBrk="0" fontAlgn="base" hangingPunct="0">
+              <a:spcBef>
+                <a:spcPct val="0"/>
+              </a:spcBef>
+              <a:spcAft>
+                <a:spcPct val="0"/>
+              </a:spcAft>
+              <a:defRPr sz="2400">
+                <a:solidFill>
+                  <a:schemeClr val="tx1"/>
+                </a:solidFill>
+                <a:latin typeface="Times New Roman" charset="0"/>
+              </a:defRPr>
+            </a:lvl9pPr>
+          </a:lstStyle>
+          <a:p>
+            <a:r>
+              <a:rPr lang="de-DE" sz="1800" b="1" dirty="0">
+                <a:solidFill>
+                  <a:srgbClr val="0000FF"/>
+                </a:solidFill>
+                <a:latin typeface="Lucida Console" panose="020B0609040504020204" pitchFamily="49" charset="0"/>
+              </a:rPr>
+              <a:t> </a:t>
+            </a:r>
+            <a:r>
+              <a:rPr lang="de-DE" sz="1800" b="1" dirty="0" err="1">
+                <a:solidFill>
+                  <a:srgbClr val="0000FF"/>
+                </a:solidFill>
+                <a:latin typeface="Lucida Console" panose="020B0609040504020204" pitchFamily="49" charset="0"/>
+              </a:rPr>
+              <a:t>unit</a:t>
+            </a:r>
+            <a:r>
+              <a:rPr lang="de-DE" sz="1800" b="1" dirty="0">
+                <a:solidFill>
+                  <a:srgbClr val="0000FF"/>
+                </a:solidFill>
+                <a:latin typeface="Lucida Console" panose="020B0609040504020204" pitchFamily="49" charset="0"/>
+              </a:rPr>
+              <a:t> </a:t>
+            </a:r>
+            <a:r>
+              <a:rPr lang="de-DE" sz="1800" dirty="0" err="1">
+                <a:solidFill>
+                  <a:srgbClr val="0000FF"/>
+                </a:solidFill>
+                <a:latin typeface="Lucida Console" panose="020B0609040504020204" pitchFamily="49" charset="0"/>
+              </a:rPr>
+              <a:t>UnitType</a:t>
+            </a:r>
+            <a:r>
+              <a:rPr lang="de-DE" sz="1800" dirty="0">
+                <a:solidFill>
+                  <a:srgbClr val="0000FF"/>
+                </a:solidFill>
+                <a:latin typeface="Lucida Console" panose="020B0609040504020204" pitchFamily="49" charset="0"/>
+              </a:rPr>
+              <a:t> {  </a:t>
+            </a:r>
+          </a:p>
+          <a:p>
+            <a:r>
+              <a:rPr lang="de-DE" sz="1800" b="1" dirty="0">
+                <a:solidFill>
+                  <a:srgbClr val="0000FF"/>
+                </a:solidFill>
+                <a:latin typeface="Lucida Console" panose="020B0609040504020204" pitchFamily="49" charset="0"/>
+              </a:rPr>
+              <a:t>   </a:t>
+            </a:r>
+            <a:r>
+              <a:rPr lang="de-DE" sz="1800" dirty="0" err="1">
+                <a:solidFill>
+                  <a:srgbClr val="0000FF"/>
+                </a:solidFill>
+                <a:latin typeface="Lucida Console" panose="020B0609040504020204" pitchFamily="49" charset="0"/>
+              </a:rPr>
+              <a:t>routine</a:t>
+            </a:r>
+            <a:r>
+              <a:rPr lang="de-DE" sz="1800" dirty="0">
+                <a:solidFill>
+                  <a:srgbClr val="0000FF"/>
+                </a:solidFill>
+                <a:latin typeface="Lucida Console" panose="020B0609040504020204" pitchFamily="49" charset="0"/>
+              </a:rPr>
+              <a:t> (</a:t>
+            </a:r>
+            <a:r>
+              <a:rPr lang="de-DE" sz="1800" dirty="0" err="1">
+                <a:solidFill>
+                  <a:srgbClr val="0000FF"/>
+                </a:solidFill>
+                <a:latin typeface="Lucida Console" panose="020B0609040504020204" pitchFamily="49" charset="0"/>
+              </a:rPr>
+              <a:t>parameter</a:t>
+            </a:r>
+            <a:r>
+              <a:rPr lang="de-DE" sz="1800" dirty="0">
+                <a:solidFill>
+                  <a:srgbClr val="0000FF"/>
+                </a:solidFill>
+                <a:latin typeface="Lucida Console" panose="020B0609040504020204" pitchFamily="49" charset="0"/>
+              </a:rPr>
+              <a:t>: T1) {</a:t>
+            </a:r>
+          </a:p>
+          <a:p>
+            <a:r>
+              <a:rPr lang="de-DE" sz="1800" dirty="0">
+                <a:solidFill>
+                  <a:srgbClr val="0000FF"/>
+                </a:solidFill>
+                <a:latin typeface="Lucida Console" panose="020B0609040504020204" pitchFamily="49" charset="0"/>
+              </a:rPr>
+              <a:t>     </a:t>
+            </a:r>
+            <a:r>
+              <a:rPr lang="de-DE" sz="1800" b="1" dirty="0" err="1">
+                <a:solidFill>
+                  <a:srgbClr val="0000FF"/>
+                </a:solidFill>
+                <a:latin typeface="Lucida Console" panose="020B0609040504020204" pitchFamily="49" charset="0"/>
+              </a:rPr>
+              <a:t>var</a:t>
+            </a:r>
+            <a:r>
+              <a:rPr lang="de-DE" sz="1800" dirty="0">
+                <a:solidFill>
+                  <a:srgbClr val="0000FF"/>
+                </a:solidFill>
+                <a:latin typeface="Lucida Console" panose="020B0609040504020204" pitchFamily="49" charset="0"/>
+              </a:rPr>
+              <a:t> </a:t>
+            </a:r>
+            <a:r>
+              <a:rPr lang="de-DE" sz="1800" dirty="0" err="1">
+                <a:solidFill>
+                  <a:srgbClr val="0000FF"/>
+                </a:solidFill>
+                <a:latin typeface="Lucida Console" panose="020B0609040504020204" pitchFamily="49" charset="0"/>
+              </a:rPr>
+              <a:t>localVar</a:t>
+            </a:r>
+            <a:r>
+              <a:rPr lang="de-DE" sz="1800" dirty="0">
+                <a:solidFill>
+                  <a:srgbClr val="0000FF"/>
+                </a:solidFill>
+                <a:latin typeface="Lucida Console" panose="020B0609040504020204" pitchFamily="49" charset="0"/>
+              </a:rPr>
+              <a:t>: T2</a:t>
+            </a:r>
+          </a:p>
+          <a:p>
+            <a:r>
+              <a:rPr lang="de-DE" sz="1800" dirty="0">
+                <a:solidFill>
+                  <a:srgbClr val="0000FF"/>
+                </a:solidFill>
+                <a:latin typeface="Lucida Console" panose="020B0609040504020204" pitchFamily="49" charset="0"/>
+              </a:rPr>
+              <a:t>     </a:t>
+            </a:r>
+            <a:r>
+              <a:rPr lang="de-DE" sz="1800" dirty="0" err="1">
+                <a:solidFill>
+                  <a:srgbClr val="0000FF"/>
+                </a:solidFill>
+                <a:latin typeface="Lucida Console" panose="020B0609040504020204" pitchFamily="49" charset="0"/>
+              </a:rPr>
+              <a:t>localConst</a:t>
+            </a:r>
+            <a:r>
+              <a:rPr lang="de-DE" sz="1800" dirty="0">
+                <a:solidFill>
+                  <a:srgbClr val="0000FF"/>
+                </a:solidFill>
+                <a:latin typeface="Lucida Console" panose="020B0609040504020204" pitchFamily="49" charset="0"/>
+              </a:rPr>
+              <a:t> </a:t>
+            </a:r>
+            <a:r>
+              <a:rPr lang="de-DE" sz="1800" b="1" dirty="0" err="1">
+                <a:solidFill>
+                  <a:srgbClr val="0000FF"/>
+                </a:solidFill>
+                <a:latin typeface="Lucida Console" panose="020B0609040504020204" pitchFamily="49" charset="0"/>
+              </a:rPr>
+              <a:t>is</a:t>
+            </a:r>
+            <a:r>
+              <a:rPr lang="de-DE" sz="1800" dirty="0">
+                <a:solidFill>
+                  <a:srgbClr val="0000FF"/>
+                </a:solidFill>
+                <a:latin typeface="Lucida Console" panose="020B0609040504020204" pitchFamily="49" charset="0"/>
+              </a:rPr>
+              <a:t> </a:t>
+            </a:r>
+            <a:r>
+              <a:rPr lang="de-DE" sz="1800" b="1" dirty="0" err="1">
+                <a:solidFill>
+                  <a:srgbClr val="0000FF"/>
+                </a:solidFill>
+                <a:latin typeface="Lucida Console" panose="020B0609040504020204" pitchFamily="49" charset="0"/>
+              </a:rPr>
+              <a:t>new</a:t>
+            </a:r>
+            <a:r>
+              <a:rPr lang="de-DE" sz="1800" dirty="0">
+                <a:solidFill>
+                  <a:srgbClr val="0000FF"/>
+                </a:solidFill>
+                <a:latin typeface="Lucida Console" panose="020B0609040504020204" pitchFamily="49" charset="0"/>
+              </a:rPr>
+              <a:t> T2 </a:t>
+            </a:r>
+            <a:endParaRPr lang="de-DE" sz="1800" b="1" dirty="0">
+              <a:solidFill>
+                <a:srgbClr val="0000FF"/>
+              </a:solidFill>
+              <a:latin typeface="Lucida Console" panose="020B0609040504020204" pitchFamily="49" charset="0"/>
+            </a:endParaRPr>
+          </a:p>
+          <a:p>
+            <a:r>
+              <a:rPr lang="de-DE" sz="1800" dirty="0">
+                <a:solidFill>
+                  <a:srgbClr val="0000FF"/>
+                </a:solidFill>
+                <a:latin typeface="Lucida Console" panose="020B0609040504020204" pitchFamily="49" charset="0"/>
+              </a:rPr>
+              <a:t>   }</a:t>
+            </a:r>
+          </a:p>
+          <a:p>
+            <a:r>
+              <a:rPr lang="de-DE" sz="1800" dirty="0">
+                <a:solidFill>
+                  <a:srgbClr val="0000FF"/>
+                </a:solidFill>
+                <a:latin typeface="Lucida Console" panose="020B0609040504020204" pitchFamily="49" charset="0"/>
+              </a:rPr>
+              <a:t>   </a:t>
+            </a:r>
+            <a:r>
+              <a:rPr lang="de-DE" sz="1800" dirty="0" err="1">
+                <a:solidFill>
+                  <a:srgbClr val="0000FF"/>
+                </a:solidFill>
+                <a:latin typeface="Lucida Console" panose="020B0609040504020204" pitchFamily="49" charset="0"/>
+              </a:rPr>
+              <a:t>objectVarAttr</a:t>
+            </a:r>
+            <a:r>
+              <a:rPr lang="de-DE" sz="1800" dirty="0">
+                <a:solidFill>
+                  <a:srgbClr val="0000FF"/>
+                </a:solidFill>
+                <a:latin typeface="Lucida Console" panose="020B0609040504020204" pitchFamily="49" charset="0"/>
+              </a:rPr>
+              <a:t>: T3</a:t>
+            </a:r>
+          </a:p>
+          <a:p>
+            <a:r>
+              <a:rPr lang="de-DE" sz="1800" dirty="0">
+                <a:solidFill>
+                  <a:srgbClr val="0000FF"/>
+                </a:solidFill>
+                <a:latin typeface="Lucida Console" panose="020B0609040504020204" pitchFamily="49" charset="0"/>
+              </a:rPr>
+              <a:t>   </a:t>
+            </a:r>
+            <a:r>
+              <a:rPr lang="de-DE" sz="1800" b="1" dirty="0" err="1">
+                <a:solidFill>
+                  <a:srgbClr val="0000FF"/>
+                </a:solidFill>
+                <a:latin typeface="Lucida Console" panose="020B0609040504020204" pitchFamily="49" charset="0"/>
+              </a:rPr>
+              <a:t>const</a:t>
+            </a:r>
+            <a:r>
+              <a:rPr lang="de-DE" sz="1800" dirty="0">
+                <a:solidFill>
+                  <a:srgbClr val="0000FF"/>
+                </a:solidFill>
+                <a:latin typeface="Lucida Console" panose="020B0609040504020204" pitchFamily="49" charset="0"/>
+              </a:rPr>
+              <a:t> </a:t>
+            </a:r>
+            <a:r>
+              <a:rPr lang="de-DE" sz="1800" dirty="0" err="1">
+                <a:solidFill>
+                  <a:srgbClr val="0000FF"/>
+                </a:solidFill>
+                <a:latin typeface="Lucida Console" panose="020B0609040504020204" pitchFamily="49" charset="0"/>
+              </a:rPr>
+              <a:t>objectConstAttr</a:t>
+            </a:r>
+            <a:r>
+              <a:rPr lang="de-DE" sz="1800" dirty="0">
+                <a:solidFill>
+                  <a:srgbClr val="0000FF"/>
+                </a:solidFill>
+                <a:latin typeface="Lucida Console" panose="020B0609040504020204" pitchFamily="49" charset="0"/>
+              </a:rPr>
+              <a:t> </a:t>
+            </a:r>
+            <a:r>
+              <a:rPr lang="de-DE" sz="1800" b="1" dirty="0" err="1">
+                <a:solidFill>
+                  <a:srgbClr val="0000FF"/>
+                </a:solidFill>
+                <a:latin typeface="Lucida Console" panose="020B0609040504020204" pitchFamily="49" charset="0"/>
+              </a:rPr>
+              <a:t>is</a:t>
+            </a:r>
+            <a:r>
+              <a:rPr lang="de-DE" sz="1800" dirty="0">
+                <a:solidFill>
+                  <a:srgbClr val="0000FF"/>
+                </a:solidFill>
+                <a:latin typeface="Lucida Console" panose="020B0609040504020204" pitchFamily="49" charset="0"/>
+              </a:rPr>
+              <a:t> </a:t>
+            </a:r>
+            <a:r>
+              <a:rPr lang="de-DE" sz="1800" b="1" dirty="0" err="1">
+                <a:solidFill>
+                  <a:srgbClr val="0000FF"/>
+                </a:solidFill>
+                <a:latin typeface="Lucida Console" panose="020B0609040504020204" pitchFamily="49" charset="0"/>
+              </a:rPr>
+              <a:t>new</a:t>
+            </a:r>
+            <a:r>
+              <a:rPr lang="de-DE" sz="1800" dirty="0">
+                <a:solidFill>
+                  <a:srgbClr val="0000FF"/>
+                </a:solidFill>
+                <a:latin typeface="Lucida Console" panose="020B0609040504020204" pitchFamily="49" charset="0"/>
+              </a:rPr>
+              <a:t> T3</a:t>
+            </a:r>
+          </a:p>
+          <a:p>
+            <a:r>
+              <a:rPr lang="de-DE" sz="1800" dirty="0">
+                <a:solidFill>
+                  <a:srgbClr val="0000FF"/>
+                </a:solidFill>
+                <a:latin typeface="Lucida Console" panose="020B0609040504020204" pitchFamily="49" charset="0"/>
+              </a:rPr>
+              <a:t> }</a:t>
+            </a:r>
+          </a:p>
+        </p:txBody>
+      </p:sp>
+      <p:sp>
+        <p:nvSpPr>
+          <p:cNvPr id="5" name="Подзаголовок 2"/>
+          <p:cNvSpPr txBox="1">
+            <a:spLocks noChangeAspect="1"/>
+          </p:cNvSpPr>
+          <p:nvPr/>
+        </p:nvSpPr>
+        <p:spPr bwMode="auto">
+          <a:xfrm>
+            <a:off x="86070" y="682258"/>
+            <a:ext cx="6277491" cy="3982629"/>
+          </a:xfrm>
+          <a:prstGeom prst="rect">
+            <a:avLst/>
+          </a:prstGeom>
+          <a:noFill/>
+          <a:ln>
+            <a:noFill/>
+          </a:ln>
+          <a:extLst>
+            <a:ext uri="{909E8E84-426E-40DD-AFC4-6F175D3DCCD1}">
+              <a14:hiddenFill xmlns:a14="http://schemas.microsoft.com/office/drawing/2010/main">
+                <a:solidFill>
+                  <a:srgbClr val="FFFFFF"/>
+                </a:solidFill>
+              </a14:hiddenFill>
+            </a:ext>
+            <a:ext uri="{91240B29-F687-4F45-9708-019B960494DF}">
+              <a14:hiddenLine xmlns:a14="http://schemas.microsoft.com/office/drawing/2010/main" w="9525">
+                <a:solidFill>
+                  <a:srgbClr val="000000"/>
+                </a:solidFill>
+                <a:miter lim="800000"/>
+                <a:headEnd/>
+                <a:tailEnd/>
+              </a14:hiddenLine>
+            </a:ext>
+          </a:extLst>
+        </p:spPr>
+        <p:txBody>
+          <a:bodyPr lIns="0" rIns="0">
+            <a:spAutoFit/>
+          </a:bodyPr>
+          <a:lstStyle>
+            <a:lvl1pPr eaLnBrk="0" hangingPunct="0">
+              <a:spcBef>
+                <a:spcPct val="20000"/>
+              </a:spcBef>
+              <a:buChar char="•"/>
+              <a:defRPr sz="3200">
+                <a:solidFill>
+                  <a:schemeClr val="tx1"/>
+                </a:solidFill>
+                <a:latin typeface="Times New Roman" charset="0"/>
+              </a:defRPr>
+            </a:lvl1pPr>
+            <a:lvl2pPr marL="742950" indent="-285750" eaLnBrk="0" hangingPunct="0">
+              <a:spcBef>
+                <a:spcPct val="20000"/>
+              </a:spcBef>
+              <a:buChar char="–"/>
+              <a:defRPr sz="2800">
+                <a:solidFill>
+                  <a:schemeClr val="tx1"/>
+                </a:solidFill>
+                <a:latin typeface="Times New Roman" charset="0"/>
+              </a:defRPr>
+            </a:lvl2pPr>
+            <a:lvl3pPr marL="1143000" indent="-228600" eaLnBrk="0" hangingPunct="0">
+              <a:spcBef>
+                <a:spcPct val="20000"/>
+              </a:spcBef>
+              <a:buChar char="•"/>
+              <a:defRPr sz="2400">
+                <a:solidFill>
+                  <a:schemeClr val="tx1"/>
+                </a:solidFill>
+                <a:latin typeface="Times New Roman" charset="0"/>
+              </a:defRPr>
+            </a:lvl3pPr>
+            <a:lvl4pPr marL="1600200" indent="-228600" eaLnBrk="0" hangingPunct="0">
+              <a:spcBef>
+                <a:spcPct val="20000"/>
+              </a:spcBef>
+              <a:buChar char="–"/>
+              <a:defRPr sz="2000">
+                <a:solidFill>
+                  <a:schemeClr val="tx1"/>
+                </a:solidFill>
+                <a:latin typeface="Times New Roman" charset="0"/>
+              </a:defRPr>
+            </a:lvl4pPr>
+            <a:lvl5pPr marL="2057400" indent="-228600" eaLnBrk="0" hangingPunct="0">
+              <a:spcBef>
+                <a:spcPct val="20000"/>
+              </a:spcBef>
+              <a:buChar char="»"/>
+              <a:defRPr sz="2000">
+                <a:solidFill>
+                  <a:schemeClr val="tx1"/>
+                </a:solidFill>
+                <a:latin typeface="Times New Roman" charset="0"/>
+              </a:defRPr>
+            </a:lvl5pPr>
+            <a:lvl6pPr marL="2514600" indent="-228600" eaLnBrk="0" fontAlgn="base" hangingPunct="0">
+              <a:spcBef>
+                <a:spcPct val="20000"/>
+              </a:spcBef>
+              <a:spcAft>
+                <a:spcPct val="0"/>
+              </a:spcAft>
+              <a:buChar char="»"/>
+              <a:defRPr sz="2000">
+                <a:solidFill>
+                  <a:schemeClr val="tx1"/>
+                </a:solidFill>
+                <a:latin typeface="Times New Roman" charset="0"/>
+              </a:defRPr>
+            </a:lvl6pPr>
+            <a:lvl7pPr marL="2971800" indent="-228600" eaLnBrk="0" fontAlgn="base" hangingPunct="0">
+              <a:spcBef>
+                <a:spcPct val="20000"/>
+              </a:spcBef>
+              <a:spcAft>
+                <a:spcPct val="0"/>
+              </a:spcAft>
+              <a:buChar char="»"/>
+              <a:defRPr sz="2000">
+                <a:solidFill>
+                  <a:schemeClr val="tx1"/>
+                </a:solidFill>
+                <a:latin typeface="Times New Roman" charset="0"/>
+              </a:defRPr>
+            </a:lvl7pPr>
+            <a:lvl8pPr marL="3429000" indent="-228600" eaLnBrk="0" fontAlgn="base" hangingPunct="0">
+              <a:spcBef>
+                <a:spcPct val="20000"/>
+              </a:spcBef>
+              <a:spcAft>
+                <a:spcPct val="0"/>
+              </a:spcAft>
+              <a:buChar char="»"/>
+              <a:defRPr sz="2000">
+                <a:solidFill>
+                  <a:schemeClr val="tx1"/>
+                </a:solidFill>
+                <a:latin typeface="Times New Roman" charset="0"/>
+              </a:defRPr>
+            </a:lvl8pPr>
+            <a:lvl9pPr marL="3886200" indent="-228600" eaLnBrk="0" fontAlgn="base" hangingPunct="0">
+              <a:spcBef>
+                <a:spcPct val="20000"/>
+              </a:spcBef>
+              <a:spcAft>
+                <a:spcPct val="0"/>
+              </a:spcAft>
+              <a:buChar char="»"/>
+              <a:defRPr sz="2000">
+                <a:solidFill>
+                  <a:schemeClr val="tx1"/>
+                </a:solidFill>
+                <a:latin typeface="Times New Roman" charset="0"/>
+              </a:defRPr>
+            </a:lvl9pPr>
+          </a:lstStyle>
+          <a:p>
+            <a:pPr marL="457200" indent="-457200" eaLnBrk="1" hangingPunct="1"/>
+            <a:r>
+              <a:rPr lang="en-US" altLang="ru-RU" sz="2800" dirty="0" smtClean="0">
+                <a:latin typeface="Times New Roman" panose="02020603050405020304" pitchFamily="18" charset="0"/>
+                <a:cs typeface="Times New Roman" panose="02020603050405020304" pitchFamily="18" charset="0"/>
+              </a:rPr>
+              <a:t>How </a:t>
+            </a:r>
+            <a:r>
+              <a:rPr lang="en-US" altLang="ru-RU" sz="2800" dirty="0" smtClean="0">
+                <a:latin typeface="Times New Roman" panose="02020603050405020304" pitchFamily="18" charset="0"/>
+                <a:cs typeface="Times New Roman" panose="02020603050405020304" pitchFamily="18" charset="0"/>
+              </a:rPr>
+              <a:t>many objects of the type can be created?</a:t>
+            </a:r>
+          </a:p>
+          <a:p>
+            <a:pPr marL="1200150" lvl="1" indent="-457200" eaLnBrk="1" hangingPunct="1"/>
+            <a:r>
+              <a:rPr lang="en-US" altLang="ru-RU" sz="2400" dirty="0" smtClean="0">
+                <a:latin typeface="Times New Roman" panose="02020603050405020304" pitchFamily="18" charset="0"/>
+                <a:cs typeface="Times New Roman" panose="02020603050405020304" pitchFamily="18" charset="0"/>
+              </a:rPr>
+              <a:t>1 (singleton) or number fixed at compile time</a:t>
+            </a:r>
+          </a:p>
+          <a:p>
+            <a:pPr marL="1200150" lvl="1" indent="-457200" eaLnBrk="1" hangingPunct="1"/>
+            <a:r>
+              <a:rPr lang="en-US" altLang="ru-RU" sz="2400" dirty="0" smtClean="0">
+                <a:latin typeface="Times New Roman" panose="02020603050405020304" pitchFamily="18" charset="0"/>
+                <a:cs typeface="Times New Roman" panose="02020603050405020304" pitchFamily="18" charset="0"/>
+              </a:rPr>
+              <a:t>Unlimited (determined by program execution)</a:t>
+            </a:r>
+          </a:p>
+          <a:p>
+            <a:pPr marL="457200" indent="-457200" eaLnBrk="1" hangingPunct="1"/>
+            <a:r>
+              <a:rPr lang="en-US" altLang="ru-RU" sz="2800" dirty="0" smtClean="0">
+                <a:latin typeface="Times New Roman" panose="02020603050405020304" pitchFamily="18" charset="0"/>
+                <a:cs typeface="Times New Roman" panose="02020603050405020304" pitchFamily="18" charset="0"/>
+              </a:rPr>
+              <a:t>Which relations can be between types?</a:t>
+            </a:r>
+          </a:p>
+          <a:p>
+            <a:pPr marL="1200150" lvl="1" indent="-457200" eaLnBrk="1" hangingPunct="1"/>
+            <a:r>
+              <a:rPr lang="en-US" altLang="ru-RU" sz="2400" dirty="0" smtClean="0">
+                <a:latin typeface="Times New Roman" panose="02020603050405020304" pitchFamily="18" charset="0"/>
+                <a:cs typeface="Times New Roman" panose="02020603050405020304" pitchFamily="18" charset="0"/>
+              </a:rPr>
+              <a:t>Inheritance (is)</a:t>
+            </a:r>
+          </a:p>
+          <a:p>
+            <a:pPr marL="1200150" lvl="1" indent="-457200" eaLnBrk="1" hangingPunct="1"/>
+            <a:r>
+              <a:rPr lang="en-US" altLang="ru-RU" sz="2400" dirty="0" smtClean="0">
+                <a:latin typeface="Times New Roman" panose="02020603050405020304" pitchFamily="18" charset="0"/>
+                <a:cs typeface="Times New Roman" panose="02020603050405020304" pitchFamily="18" charset="0"/>
+              </a:rPr>
+              <a:t>Usage (aggregation, has)</a:t>
+            </a:r>
+          </a:p>
+        </p:txBody>
+      </p:sp>
+      <p:sp>
+        <p:nvSpPr>
+          <p:cNvPr id="8" name="TextBox 7"/>
+          <p:cNvSpPr txBox="1"/>
+          <p:nvPr/>
+        </p:nvSpPr>
+        <p:spPr>
+          <a:xfrm>
+            <a:off x="1831650" y="168315"/>
+            <a:ext cx="8441012" cy="707886"/>
+          </a:xfrm>
+          <a:prstGeom prst="rect">
+            <a:avLst/>
+          </a:prstGeom>
+          <a:noFill/>
+        </p:spPr>
+        <p:txBody>
+          <a:bodyPr wrap="square" rtlCol="0">
+            <a:spAutoFit/>
+          </a:bodyPr>
+          <a:lstStyle/>
+          <a:p>
+            <a:pPr algn="ctr"/>
+            <a:r>
+              <a:rPr lang="en-US" sz="4000" b="1" dirty="0" smtClean="0">
+                <a:solidFill>
+                  <a:srgbClr val="CC6600"/>
+                </a:solidFill>
+                <a:latin typeface="Comic Sans MS" panose="030F0702030302020204" pitchFamily="66" charset="0"/>
+              </a:rPr>
+              <a:t>Types (II)</a:t>
+            </a:r>
+            <a:endParaRPr lang="ru-RU" sz="4000" b="1" dirty="0">
+              <a:solidFill>
+                <a:srgbClr val="CC6600"/>
+              </a:solidFill>
+              <a:latin typeface="Comic Sans MS" panose="030F0702030302020204" pitchFamily="66" charset="0"/>
+            </a:endParaRPr>
+          </a:p>
+        </p:txBody>
+      </p:sp>
+    </p:spTree>
+    <p:extLst>
+      <p:ext uri="{BB962C8B-B14F-4D97-AF65-F5344CB8AC3E}">
+        <p14:creationId xmlns:p14="http://schemas.microsoft.com/office/powerpoint/2010/main" val="3656335889"/>
       </p:ext>
     </p:extLst>
   </p:cSld>
@@ -8002,7 +9134,7 @@
   <a:extraClrSchemeLst/>
   <a:extLst>
     <a:ext uri="{05A4C25C-085E-4340-85A3-A5531E510DB2}">
-      <thm15:themeFamily xmlns="" xmlns:thm15="http://schemas.microsoft.com/office/thememl/2012/main" name="Office Theme" id="{62F939B6-93AF-4DB8-9C6B-D6C7DFDC589F}" vid="{4A3C46E8-61CC-4603-A589-7422A47A8E4A}"/>
+      <thm15:themeFamily xmlns:thm15="http://schemas.microsoft.com/office/thememl/2012/main" xmlns="" name="Office Theme" id="{62F939B6-93AF-4DB8-9C6B-D6C7DFDC589F}" vid="{4A3C46E8-61CC-4603-A589-7422A47A8E4A}"/>
     </a:ext>
   </a:extLst>
 </a:theme>

</xml_diff>